<commit_message>
edit first 5 prob.pptx
</commit_message>
<xml_diff>
--- a/spring13/slides13/prob-conditional.pptx
+++ b/spring13/slides13/prob-conditional.pptx
@@ -3912,11 +3912,11 @@
             </a:pPr>
             <a:r>
               <a:rPr lang="en-US" dirty="0" err="1" smtClean="0"/>
-              <a:t>lec</a:t>
+              <a:t>condprob</a:t>
             </a:r>
             <a:r>
               <a:rPr lang="en-US" dirty="0" smtClean="0"/>
-              <a:t> !2M.</a:t>
+              <a:t>.</a:t>
             </a:r>
             <a:fld id="{B9A0B45D-6AFD-413C-B761-B121FB8BE940}" type="slidenum">
               <a:rPr lang="en-US" smtClean="0"/>
@@ -4079,11 +4079,11 @@
             </a:pPr>
             <a:r>
               <a:rPr lang="en-US" dirty="0" err="1" smtClean="0"/>
-              <a:t>lec</a:t>
+              <a:t>condprob</a:t>
             </a:r>
             <a:r>
               <a:rPr lang="en-US" dirty="0" smtClean="0"/>
-              <a:t> !2M.</a:t>
+              <a:t>.</a:t>
             </a:r>
             <a:fld id="{B9A0B45D-6AFD-413C-B761-B121FB8BE940}" type="slidenum">
               <a:rPr lang="en-US" smtClean="0"/>
@@ -4201,11 +4201,11 @@
             </a:pPr>
             <a:r>
               <a:rPr lang="en-US" dirty="0" err="1" smtClean="0"/>
-              <a:t>lec</a:t>
+              <a:t>condprob</a:t>
             </a:r>
             <a:r>
               <a:rPr lang="en-US" dirty="0" smtClean="0"/>
-              <a:t> !2M.</a:t>
+              <a:t>.</a:t>
             </a:r>
             <a:fld id="{B9A0B45D-6AFD-413C-B761-B121FB8BE940}" type="slidenum">
               <a:rPr lang="en-US" smtClean="0"/>
@@ -4289,11 +4289,11 @@
             </a:pPr>
             <a:r>
               <a:rPr lang="en-US" dirty="0" err="1" smtClean="0"/>
-              <a:t>lec</a:t>
+              <a:t>condprob</a:t>
             </a:r>
             <a:r>
               <a:rPr lang="en-US" dirty="0" smtClean="0"/>
-              <a:t> !2M.</a:t>
+              <a:t>.</a:t>
             </a:r>
             <a:fld id="{B9A0B45D-6AFD-413C-B761-B121FB8BE940}" type="slidenum">
               <a:rPr lang="en-US" smtClean="0"/>
@@ -4519,11 +4519,11 @@
             </a:pPr>
             <a:r>
               <a:rPr lang="en-US" dirty="0" err="1" smtClean="0"/>
-              <a:t>lec</a:t>
+              <a:t>condprob</a:t>
             </a:r>
             <a:r>
               <a:rPr lang="en-US" dirty="0" smtClean="0"/>
-              <a:t> !2M.</a:t>
+              <a:t>.</a:t>
             </a:r>
             <a:fld id="{B9A0B45D-6AFD-413C-B761-B121FB8BE940}" type="slidenum">
               <a:rPr lang="en-US" smtClean="0"/>
@@ -4730,11 +4730,11 @@
             </a:pPr>
             <a:r>
               <a:rPr lang="en-US" dirty="0" err="1" smtClean="0"/>
-              <a:t>lec</a:t>
+              <a:t>condprob</a:t>
             </a:r>
             <a:r>
               <a:rPr lang="en-US" dirty="0" smtClean="0"/>
-              <a:t> 12M.</a:t>
+              <a:t>.</a:t>
             </a:r>
             <a:fld id="{B9A0B45D-6AFD-413C-B761-B121FB8BE940}" type="slidenum">
               <a:rPr lang="en-US" smtClean="0"/>
@@ -4830,7 +4830,22 @@
                 <a:uFillTx/>
                 <a:latin typeface="Comic Sans MS" pitchFamily="66" charset="0"/>
               </a:rPr>
-              <a:t>Albert R Meyer,            April 30, 2012</a:t>
+              <a:t>Albert R Meyer,            </a:t>
+            </a:r>
+            <a:r>
+              <a:rPr kumimoji="0" lang="en-US" sz="1200" b="0" i="0" u="none" strike="noStrike" kern="1200" cap="none" spc="0" normalizeH="0" baseline="0" noProof="0" dirty="0" smtClean="0">
+                <a:ln>
+                  <a:noFill/>
+                </a:ln>
+                <a:solidFill>
+                  <a:schemeClr val="tx1"/>
+                </a:solidFill>
+                <a:effectLst/>
+                <a:uLnTx/>
+                <a:uFillTx/>
+                <a:latin typeface="Comic Sans MS" pitchFamily="66" charset="0"/>
+              </a:rPr>
+              <a:t>May 3, 2013</a:t>
             </a:r>
             <a:endParaRPr kumimoji="0" lang="en-US" sz="1200" b="0" i="0" u="none" strike="noStrike" kern="1200" cap="none" spc="0" normalizeH="0" baseline="0" noProof="0" dirty="0">
               <a:ln>
@@ -5300,12 +5315,12 @@
               <a:defRPr/>
             </a:pPr>
             <a:r>
-              <a:rPr lang="en-US" dirty="0" err="1"/>
-              <a:t>lec</a:t>
+              <a:rPr lang="en-US" dirty="0" err="1" smtClean="0"/>
+              <a:t>condprob</a:t>
             </a:r>
             <a:r>
               <a:rPr lang="en-US" dirty="0" smtClean="0"/>
-              <a:t> !2M.</a:t>
+              <a:t>.</a:t>
             </a:r>
             <a:fld id="{B7DC7BFF-89A2-4DCB-9AA1-7530640AAA05}" type="slidenum">
               <a:rPr lang="en-US" smtClean="0"/>
@@ -5493,7 +5508,7 @@
                 <a:ea typeface="+mn-ea"/>
                 <a:cs typeface="+mn-cs"/>
               </a:rPr>
-              <a:t>lec</a:t>
+              <a:t>condprob</a:t>
             </a:r>
             <a:r>
               <a:rPr kumimoji="0" lang="en-US" sz="1200" b="0" i="0" u="none" strike="noStrike" kern="1200" cap="none" spc="0" normalizeH="0" baseline="0" noProof="0" dirty="0" smtClean="0">
@@ -5510,7 +5525,7 @@
                 <a:ea typeface="+mn-ea"/>
                 <a:cs typeface="+mn-cs"/>
               </a:rPr>
-              <a:t> !2M.</a:t>
+              <a:t>.</a:t>
             </a:r>
             <a:fld id="{B9A0B45D-6AFD-413C-B761-B121FB8BE940}" type="slidenum">
               <a:rPr kumimoji="0" lang="en-US" sz="1200" b="0" i="0" u="none" strike="noStrike" kern="1200" cap="none" spc="0" normalizeH="0" baseline="0" noProof="0" smtClean="0">
@@ -5647,12 +5662,12 @@
               <a:defRPr/>
             </a:pPr>
             <a:r>
-              <a:rPr lang="en-US" dirty="0" err="1"/>
-              <a:t>lec</a:t>
+              <a:rPr lang="en-US" dirty="0" err="1" smtClean="0"/>
+              <a:t>condprob</a:t>
             </a:r>
             <a:r>
               <a:rPr lang="en-US" dirty="0" smtClean="0"/>
-              <a:t> !2M.</a:t>
+              <a:t>.</a:t>
             </a:r>
             <a:fld id="{3E4C6C7A-C13C-402F-A962-0DA50AE12534}" type="slidenum">
               <a:rPr lang="en-US" smtClean="0"/>
@@ -5912,7 +5927,7 @@
           <a:graphicData uri="http://schemas.openxmlformats.org/presentationml/2006/ole">
             <mc:AlternateContent xmlns:mc="http://schemas.openxmlformats.org/markup-compatibility/2006">
               <mc:Choice xmlns:v="urn:schemas-microsoft-com:vml" Requires="v">
-                <p:oleObj spid="_x0000_s2100" name="Equation" r:id="rId4" imgW="1612900" imgH="495300" progId="Equation.DSMT4">
+                <p:oleObj spid="_x0000_s2107" name="Equation" r:id="rId4" imgW="1612900" imgH="495300" progId="Equation.DSMT4">
                   <p:embed/>
                 </p:oleObj>
               </mc:Choice>
@@ -6031,7 +6046,7 @@
                 <a:ea typeface="+mn-ea"/>
                 <a:cs typeface="+mn-cs"/>
               </a:rPr>
-              <a:t>lec</a:t>
+              <a:t>condprob</a:t>
             </a:r>
             <a:r>
               <a:rPr kumimoji="0" lang="en-US" sz="1200" b="0" i="0" u="none" strike="noStrike" kern="1200" cap="none" spc="0" normalizeH="0" baseline="0" noProof="0" dirty="0" smtClean="0">
@@ -6048,7 +6063,7 @@
                 <a:ea typeface="+mn-ea"/>
                 <a:cs typeface="+mn-cs"/>
               </a:rPr>
-              <a:t> !2M.</a:t>
+              <a:t>.</a:t>
             </a:r>
             <a:fld id="{B9A0B45D-6AFD-413C-B761-B121FB8BE940}" type="slidenum">
               <a:rPr kumimoji="0" lang="en-US" sz="1200" b="0" i="0" u="none" strike="noStrike" kern="1200" cap="none" spc="0" normalizeH="0" baseline="0" noProof="0" smtClean="0">
@@ -6157,8 +6172,8 @@
   <p:clrMapOvr>
     <a:masterClrMapping/>
   </p:clrMapOvr>
-  <p:transition xmlns:p14="http://schemas.microsoft.com/office/powerpoint/2010/main">
-    <p:fade thruBlk="1"/>
+  <p:transition xmlns:p14="http://schemas.microsoft.com/office/powerpoint/2010/main" spd="slow" advClick="0">
+    <p:fade/>
   </p:transition>
   <p:timing>
     <p:tnLst>
@@ -6416,7 +6431,7 @@
           <a:graphicData uri="http://schemas.openxmlformats.org/presentationml/2006/ole">
             <mc:AlternateContent xmlns:mc="http://schemas.openxmlformats.org/markup-compatibility/2006">
               <mc:Choice xmlns:v="urn:schemas-microsoft-com:vml" Requires="v">
-                <p:oleObj spid="_x0000_s333862" name="Equation" r:id="rId4" imgW="1511300" imgH="685800" progId="Equation.DSMT4">
+                <p:oleObj spid="_x0000_s333868" name="Equation" r:id="rId4" imgW="1511300" imgH="685800" progId="Equation.DSMT4">
                   <p:embed/>
                 </p:oleObj>
               </mc:Choice>
@@ -6480,12 +6495,12 @@
               <a:defRPr/>
             </a:pPr>
             <a:r>
-              <a:rPr lang="en-US" dirty="0" err="1"/>
-              <a:t>lec</a:t>
+              <a:rPr lang="en-US" dirty="0" err="1" smtClean="0"/>
+              <a:t>condprob</a:t>
             </a:r>
             <a:r>
               <a:rPr lang="en-US" dirty="0" smtClean="0"/>
-              <a:t> !2M.</a:t>
+              <a:t>.</a:t>
             </a:r>
             <a:fld id="{6243465B-1FAC-4BC8-AF6F-DE32C2D781D1}" type="slidenum">
               <a:rPr lang="en-US" smtClean="0"/>
@@ -10973,11 +10988,11 @@
             </a:pPr>
             <a:r>
               <a:rPr lang="en-US" dirty="0" err="1" smtClean="0"/>
-              <a:t>lec</a:t>
+              <a:t>condprob</a:t>
             </a:r>
             <a:r>
               <a:rPr lang="en-US" dirty="0" smtClean="0"/>
-              <a:t> !2M.</a:t>
+              <a:t>.</a:t>
             </a:r>
             <a:fld id="{17233D2A-0857-4415-88C1-423492E69A26}" type="slidenum">
               <a:rPr lang="en-US" smtClean="0"/>
@@ -11371,7 +11386,7 @@
           <a:graphicData uri="http://schemas.openxmlformats.org/presentationml/2006/ole">
             <mc:AlternateContent xmlns:mc="http://schemas.openxmlformats.org/markup-compatibility/2006">
               <mc:Choice xmlns:v="urn:schemas-microsoft-com:vml" Requires="v">
-                <p:oleObj spid="_x0000_s343063" name="Equation" r:id="rId4" imgW="177800" imgH="533400" progId="Equation.DSMT4">
+                <p:oleObj spid="_x0000_s343075" name="Equation" r:id="rId4" imgW="177800" imgH="533400" progId="Equation.DSMT4">
                   <p:embed/>
                 </p:oleObj>
               </mc:Choice>
@@ -11428,7 +11443,7 @@
           <a:graphicData uri="http://schemas.openxmlformats.org/presentationml/2006/ole">
             <mc:AlternateContent xmlns:mc="http://schemas.openxmlformats.org/markup-compatibility/2006">
               <mc:Choice xmlns:v="urn:schemas-microsoft-com:vml" Requires="v">
-                <p:oleObj spid="_x0000_s343064" name="Equation" r:id="rId6" imgW="177800" imgH="533400" progId="Equation.DSMT4">
+                <p:oleObj spid="_x0000_s343076" name="Equation" r:id="rId6" imgW="177800" imgH="533400" progId="Equation.DSMT4">
                   <p:embed/>
                 </p:oleObj>
               </mc:Choice>
@@ -11473,15 +11488,15 @@
   <p:clrMapOvr>
     <a:masterClrMapping/>
   </p:clrMapOvr>
-  <mc:AlternateContent xmlns:mc="http://schemas.openxmlformats.org/markup-compatibility/2006" xmlns:p14="http://schemas.microsoft.com/office/powerpoint/2010/main">
-    <mc:Choice Requires="p14">
-      <p:transition spd="slow" p14:dur="800">
-        <p:fade/>
+  <mc:AlternateContent xmlns:mc="http://schemas.openxmlformats.org/markup-compatibility/2006">
+    <mc:Choice xmlns:p14="http://schemas.microsoft.com/office/powerpoint/2010/main" Requires="p14">
+      <p:transition spd="slow" p14:dur="1200">
+        <p:fade thruBlk="1"/>
       </p:transition>
     </mc:Choice>
-    <mc:Fallback xmlns="">
+    <mc:Fallback>
       <p:transition xmlns:p14="http://schemas.microsoft.com/office/powerpoint/2010/main" spd="slow">
-        <p:fade/>
+        <p:fade thruBlk="1"/>
       </p:transition>
     </mc:Fallback>
   </mc:AlternateContent>
@@ -16325,11 +16340,11 @@
             </a:pPr>
             <a:r>
               <a:rPr lang="en-US" dirty="0" err="1" smtClean="0"/>
-              <a:t>lec</a:t>
+              <a:t>condprob</a:t>
             </a:r>
             <a:r>
               <a:rPr lang="en-US" dirty="0" smtClean="0"/>
-              <a:t> !2M.</a:t>
+              <a:t>.</a:t>
             </a:r>
             <a:fld id="{17233D2A-0857-4415-88C1-423492E69A26}" type="slidenum">
               <a:rPr lang="en-US" smtClean="0"/>
@@ -16768,7 +16783,7 @@
           <a:graphicData uri="http://schemas.openxmlformats.org/presentationml/2006/ole">
             <mc:AlternateContent xmlns:mc="http://schemas.openxmlformats.org/markup-compatibility/2006">
               <mc:Choice xmlns:v="urn:schemas-microsoft-com:vml" Requires="v">
-                <p:oleObj spid="_x0000_s348177" name="Equation" r:id="rId4" imgW="177800" imgH="533400" progId="Equation.DSMT4">
+                <p:oleObj spid="_x0000_s348191" name="Equation" r:id="rId4" imgW="177800" imgH="533400" progId="Equation.DSMT4">
                   <p:embed/>
                 </p:oleObj>
               </mc:Choice>
@@ -16825,7 +16840,7 @@
           <a:graphicData uri="http://schemas.openxmlformats.org/presentationml/2006/ole">
             <mc:AlternateContent xmlns:mc="http://schemas.openxmlformats.org/markup-compatibility/2006">
               <mc:Choice xmlns:v="urn:schemas-microsoft-com:vml" Requires="v">
-                <p:oleObj spid="_x0000_s348178" name="Equation" r:id="rId6" imgW="177800" imgH="533400" progId="Equation.DSMT4">
+                <p:oleObj spid="_x0000_s348192" name="Equation" r:id="rId6" imgW="177800" imgH="533400" progId="Equation.DSMT4">
                   <p:embed/>
                 </p:oleObj>
               </mc:Choice>
@@ -16882,7 +16897,7 @@
           <a:graphicData uri="http://schemas.openxmlformats.org/presentationml/2006/ole">
             <mc:AlternateContent xmlns:mc="http://schemas.openxmlformats.org/markup-compatibility/2006">
               <mc:Choice xmlns:v="urn:schemas-microsoft-com:vml" Requires="v">
-                <p:oleObj spid="_x0000_s348179" name="Equation" r:id="rId7" imgW="177800" imgH="533400" progId="Equation.DSMT4">
+                <p:oleObj spid="_x0000_s348193" name="Equation" r:id="rId7" imgW="177800" imgH="533400" progId="Equation.DSMT4">
                   <p:embed/>
                 </p:oleObj>
               </mc:Choice>
@@ -17331,12 +17346,12 @@
               <a:defRPr/>
             </a:pPr>
             <a:r>
-              <a:rPr lang="en-US" dirty="0" err="1"/>
-              <a:t>lec</a:t>
+              <a:rPr lang="en-US" dirty="0" err="1" smtClean="0"/>
+              <a:t>condprob</a:t>
             </a:r>
             <a:r>
               <a:rPr lang="en-US" dirty="0" smtClean="0"/>
-              <a:t> !2M.</a:t>
+              <a:t>.</a:t>
             </a:r>
             <a:fld id="{99668625-B7B6-4F60-B5FE-C35153036580}" type="slidenum">
               <a:rPr lang="en-US" smtClean="0"/>
@@ -17565,7 +17580,7 @@
                 <a:ea typeface="+mn-ea"/>
                 <a:cs typeface="+mn-cs"/>
               </a:rPr>
-              <a:t>lec</a:t>
+              <a:t>condprob</a:t>
             </a:r>
             <a:r>
               <a:rPr kumimoji="0" lang="en-US" sz="1200" b="0" i="0" u="none" strike="noStrike" kern="1200" cap="none" spc="0" normalizeH="0" baseline="0" noProof="0" dirty="0" smtClean="0">
@@ -17582,7 +17597,7 @@
                 <a:ea typeface="+mn-ea"/>
                 <a:cs typeface="+mn-cs"/>
               </a:rPr>
-              <a:t> !2M.</a:t>
+              <a:t>.</a:t>
             </a:r>
             <a:fld id="{B9A0B45D-6AFD-413C-B761-B121FB8BE940}" type="slidenum">
               <a:rPr kumimoji="0" lang="en-US" sz="1200" b="0" i="0" u="none" strike="noStrike" kern="1200" cap="none" spc="0" normalizeH="0" baseline="0" noProof="0" smtClean="0">
@@ -17689,7 +17704,7 @@
                                     </p:set>
                                     <p:anim calcmode="lin" valueType="num">
                                       <p:cBhvr>
-                                        <p:cTn id="7" dur="500" fill="hold"/>
+                                        <p:cTn id="7" dur="1000" fill="hold"/>
                                         <p:tgtEl>
                                           <p:spTgt spid="24583"/>
                                         </p:tgtEl>
@@ -17712,7 +17727,7 @@
                                     </p:anim>
                                     <p:anim calcmode="lin" valueType="num">
                                       <p:cBhvr>
-                                        <p:cTn id="8" dur="500" fill="hold"/>
+                                        <p:cTn id="8" dur="1000" fill="hold"/>
                                         <p:tgtEl>
                                           <p:spTgt spid="24583"/>
                                         </p:tgtEl>
@@ -17735,7 +17750,7 @@
                                     </p:anim>
                                     <p:anim calcmode="lin" valueType="num">
                                       <p:cBhvr>
-                                        <p:cTn id="9" dur="500" fill="hold"/>
+                                        <p:cTn id="9" dur="1000" fill="hold"/>
                                         <p:tgtEl>
                                           <p:spTgt spid="24583"/>
                                         </p:tgtEl>
@@ -17758,7 +17773,7 @@
                                     </p:anim>
                                     <p:anim calcmode="lin" valueType="num">
                                       <p:cBhvr>
-                                        <p:cTn id="10" dur="500" fill="hold"/>
+                                        <p:cTn id="10" dur="1000" fill="hold"/>
                                         <p:tgtEl>
                                           <p:spTgt spid="24583"/>
                                         </p:tgtEl>
@@ -18476,12 +18491,12 @@
               <a:defRPr/>
             </a:pPr>
             <a:r>
-              <a:rPr lang="en-US" dirty="0" err="1"/>
-              <a:t>lec</a:t>
+              <a:rPr lang="en-US" dirty="0" err="1" smtClean="0"/>
+              <a:t>condprob</a:t>
             </a:r>
             <a:r>
               <a:rPr lang="en-US" dirty="0" smtClean="0"/>
-              <a:t> !2M.</a:t>
+              <a:t>.</a:t>
             </a:r>
             <a:fld id="{99668625-B7B6-4F60-B5FE-C35153036580}" type="slidenum">
               <a:rPr lang="en-US" smtClean="0"/>
@@ -18788,7 +18803,7 @@
                 <a:ea typeface="+mn-ea"/>
                 <a:cs typeface="+mn-cs"/>
               </a:rPr>
-              <a:t>lec</a:t>
+              <a:t>condprob</a:t>
             </a:r>
             <a:r>
               <a:rPr kumimoji="0" lang="en-US" sz="1200" b="0" i="0" u="none" strike="noStrike" kern="1200" cap="none" spc="0" normalizeH="0" baseline="0" noProof="0" dirty="0" smtClean="0">
@@ -18805,7 +18820,7 @@
                 <a:ea typeface="+mn-ea"/>
                 <a:cs typeface="+mn-cs"/>
               </a:rPr>
-              <a:t> !2M.</a:t>
+              <a:t>.</a:t>
             </a:r>
             <a:fld id="{B9A0B45D-6AFD-413C-B761-B121FB8BE940}" type="slidenum">
               <a:rPr kumimoji="0" lang="en-US" sz="1200" b="0" i="0" u="none" strike="noStrike" kern="1200" cap="none" spc="0" normalizeH="0" baseline="0" noProof="0" smtClean="0">
@@ -18931,12 +18946,12 @@
               <a:defRPr/>
             </a:pPr>
             <a:r>
-              <a:rPr lang="en-US" dirty="0" err="1"/>
-              <a:t>lec</a:t>
+              <a:rPr lang="en-US" dirty="0" err="1" smtClean="0"/>
+              <a:t>condprob</a:t>
             </a:r>
             <a:r>
               <a:rPr lang="en-US" dirty="0" smtClean="0"/>
-              <a:t> !2M.</a:t>
+              <a:t>.</a:t>
             </a:r>
             <a:fld id="{FCF15E04-3298-48B5-AD07-D0187196EF10}" type="slidenum">
               <a:rPr lang="en-US" smtClean="0"/>
@@ -19386,7 +19401,7 @@
                 <a:ea typeface="+mn-ea"/>
                 <a:cs typeface="+mn-cs"/>
               </a:rPr>
-              <a:t>lec</a:t>
+              <a:t>condprob</a:t>
             </a:r>
             <a:r>
               <a:rPr kumimoji="0" lang="en-US" sz="1200" b="0" i="0" u="none" strike="noStrike" kern="1200" cap="none" spc="0" normalizeH="0" baseline="0" noProof="0" dirty="0" smtClean="0">
@@ -19403,7 +19418,7 @@
                 <a:ea typeface="+mn-ea"/>
                 <a:cs typeface="+mn-cs"/>
               </a:rPr>
-              <a:t> !2M.</a:t>
+              <a:t>.</a:t>
             </a:r>
             <a:fld id="{B9A0B45D-6AFD-413C-B761-B121FB8BE940}" type="slidenum">
               <a:rPr kumimoji="0" lang="en-US" sz="1200" b="0" i="0" u="none" strike="noStrike" kern="1200" cap="none" spc="0" normalizeH="0" baseline="0" noProof="0" smtClean="0">
@@ -19812,12 +19827,12 @@
               <a:defRPr/>
             </a:pPr>
             <a:r>
-              <a:rPr lang="en-US" dirty="0" err="1"/>
-              <a:t>lec</a:t>
+              <a:rPr lang="en-US" dirty="0" err="1" smtClean="0"/>
+              <a:t>condprob</a:t>
             </a:r>
             <a:r>
               <a:rPr lang="en-US" dirty="0" smtClean="0"/>
-              <a:t> !2M.</a:t>
+              <a:t>.</a:t>
             </a:r>
             <a:fld id="{FCF15E04-3298-48B5-AD07-D0187196EF10}" type="slidenum">
               <a:rPr lang="en-US" smtClean="0"/>
@@ -20345,7 +20360,7 @@
                 <a:ea typeface="+mn-ea"/>
                 <a:cs typeface="+mn-cs"/>
               </a:rPr>
-              <a:t>lec</a:t>
+              <a:t>condprob</a:t>
             </a:r>
             <a:r>
               <a:rPr kumimoji="0" lang="en-US" sz="1200" b="0" i="0" u="none" strike="noStrike" kern="1200" cap="none" spc="0" normalizeH="0" baseline="0" noProof="0" dirty="0" smtClean="0">
@@ -20362,7 +20377,7 @@
                 <a:ea typeface="+mn-ea"/>
                 <a:cs typeface="+mn-cs"/>
               </a:rPr>
-              <a:t> !2M.</a:t>
+              <a:t>.</a:t>
             </a:r>
             <a:fld id="{B9A0B45D-6AFD-413C-B761-B121FB8BE940}" type="slidenum">
               <a:rPr kumimoji="0" lang="en-US" sz="1200" b="0" i="0" u="none" strike="noStrike" kern="1200" cap="none" spc="0" normalizeH="0" baseline="0" noProof="0" smtClean="0">
@@ -24822,11 +24837,11 @@
             </a:pPr>
             <a:r>
               <a:rPr lang="en-US" dirty="0" err="1" smtClean="0"/>
-              <a:t>lec</a:t>
+              <a:t>condprob</a:t>
             </a:r>
             <a:r>
               <a:rPr lang="en-US" dirty="0" smtClean="0"/>
-              <a:t> !2M.</a:t>
+              <a:t>.</a:t>
             </a:r>
             <a:fld id="{17233D2A-0857-4415-88C1-423492E69A26}" type="slidenum">
               <a:rPr lang="en-US" smtClean="0"/>
@@ -29699,11 +29714,11 @@
             </a:pPr>
             <a:r>
               <a:rPr lang="en-US" dirty="0" err="1" smtClean="0"/>
-              <a:t>lec</a:t>
+              <a:t>condprob</a:t>
             </a:r>
             <a:r>
               <a:rPr lang="en-US" dirty="0" smtClean="0"/>
-              <a:t> !2M.</a:t>
+              <a:t>.</a:t>
             </a:r>
             <a:fld id="{17233D2A-0857-4415-88C1-423492E69A26}" type="slidenum">
               <a:rPr lang="en-US" smtClean="0"/>
@@ -30176,7 +30191,7 @@
 </file>
 
 <file path=ppt/slides/slide2.xml><?xml version="1.0" encoding="utf-8"?>
-<p:sld xmlns:a="http://schemas.openxmlformats.org/drawingml/2006/main" xmlns:r="http://schemas.openxmlformats.org/officeDocument/2006/relationships" xmlns:p="http://schemas.openxmlformats.org/presentationml/2006/main" show="0">
+<p:sld xmlns:a="http://schemas.openxmlformats.org/drawingml/2006/main" xmlns:r="http://schemas.openxmlformats.org/officeDocument/2006/relationships" xmlns:p="http://schemas.openxmlformats.org/presentationml/2006/main">
   <p:cSld>
     <p:spTree>
       <p:nvGrpSpPr>
@@ -30216,12 +30231,12 @@
               <a:defRPr/>
             </a:pPr>
             <a:r>
-              <a:rPr lang="en-US" dirty="0" err="1"/>
-              <a:t>lec</a:t>
+              <a:rPr lang="en-US" dirty="0" err="1" smtClean="0"/>
+              <a:t>condprob</a:t>
             </a:r>
             <a:r>
               <a:rPr lang="en-US" dirty="0" smtClean="0"/>
-              <a:t> !2M.</a:t>
+              <a:t>.</a:t>
             </a:r>
             <a:fld id="{52B71504-A7D4-4915-9F12-4FB8BCF731C5}" type="slidenum">
               <a:rPr lang="en-US" smtClean="0"/>
@@ -30355,7 +30370,7 @@
           <a:graphicData uri="http://schemas.openxmlformats.org/presentationml/2006/ole">
             <mc:AlternateContent xmlns:mc="http://schemas.openxmlformats.org/markup-compatibility/2006">
               <mc:Choice xmlns:v="urn:schemas-microsoft-com:vml" Requires="v">
-                <p:oleObj spid="_x0000_s1108" name="Equation" r:id="rId4" imgW="2260440" imgH="533160" progId="Equation.DSMT4">
+                <p:oleObj spid="_x0000_s1118" name="Equation" r:id="rId4" imgW="2260440" imgH="533160" progId="Equation.DSMT4">
                   <p:embed/>
                 </p:oleObj>
               </mc:Choice>
@@ -30425,7 +30440,7 @@
           <a:graphicData uri="http://schemas.openxmlformats.org/presentationml/2006/ole">
             <mc:AlternateContent xmlns:mc="http://schemas.openxmlformats.org/markup-compatibility/2006">
               <mc:Choice xmlns:v="urn:schemas-microsoft-com:vml" Requires="v">
-                <p:oleObj spid="_x0000_s1109" name="Equation" r:id="rId6" imgW="1117440" imgH="533160" progId="Equation.DSMT4">
+                <p:oleObj spid="_x0000_s1119" name="Equation" r:id="rId6" imgW="1117440" imgH="533160" progId="Equation.DSMT4">
                   <p:embed/>
                 </p:oleObj>
               </mc:Choice>
@@ -30550,7 +30565,7 @@
                 <a:ea typeface="+mn-ea"/>
                 <a:cs typeface="+mn-cs"/>
               </a:rPr>
-              <a:t>lec</a:t>
+              <a:t>condprob</a:t>
             </a:r>
             <a:r>
               <a:rPr kumimoji="0" lang="en-US" sz="1200" b="0" i="0" u="none" strike="noStrike" kern="1200" cap="none" spc="0" normalizeH="0" baseline="0" noProof="0" dirty="0" smtClean="0">
@@ -30567,7 +30582,7 @@
                 <a:ea typeface="+mn-ea"/>
                 <a:cs typeface="+mn-cs"/>
               </a:rPr>
-              <a:t> !2M.</a:t>
+              <a:t>.</a:t>
             </a:r>
             <a:fld id="{B9A0B45D-6AFD-413C-B761-B121FB8BE940}" type="slidenum">
               <a:rPr kumimoji="0" lang="en-US" sz="1200" b="0" i="0" u="none" strike="noStrike" kern="1200" cap="none" spc="0" normalizeH="0" baseline="0" noProof="0" smtClean="0">
@@ -30705,7 +30720,7 @@
                             </p:stCondLst>
                             <p:childTnLst>
                               <p:par>
-                                <p:cTn id="10" presetID="1" presetClass="entr" presetSubtype="0" fill="hold" nodeType="clickEffect">
+                                <p:cTn id="10" presetID="10" presetClass="entr" presetSubtype="0" fill="hold" nodeType="clickEffect">
                                   <p:stCondLst>
                                     <p:cond delay="0"/>
                                   </p:stCondLst>
@@ -30713,55 +30728,6 @@
                                     <p:set>
                                       <p:cBhvr>
                                         <p:cTn id="11" dur="1" fill="hold">
-                                          <p:stCondLst>
-                                            <p:cond delay="0"/>
-                                          </p:stCondLst>
-                                        </p:cTn>
-                                        <p:tgtEl>
-                                          <p:spTgt spid="54275">
-                                            <p:txEl>
-                                              <p:pRg st="0" end="0"/>
-                                            </p:txEl>
-                                          </p:spTgt>
-                                        </p:tgtEl>
-                                        <p:attrNameLst>
-                                          <p:attrName>style.visibility</p:attrName>
-                                        </p:attrNameLst>
-                                      </p:cBhvr>
-                                      <p:to>
-                                        <p:strVal val="visible"/>
-                                      </p:to>
-                                    </p:set>
-                                  </p:childTnLst>
-                                </p:cTn>
-                              </p:par>
-                            </p:childTnLst>
-                          </p:cTn>
-                        </p:par>
-                      </p:childTnLst>
-                    </p:cTn>
-                  </p:par>
-                  <p:par>
-                    <p:cTn id="12" fill="hold">
-                      <p:stCondLst>
-                        <p:cond delay="indefinite"/>
-                      </p:stCondLst>
-                      <p:childTnLst>
-                        <p:par>
-                          <p:cTn id="13" fill="hold">
-                            <p:stCondLst>
-                              <p:cond delay="0"/>
-                            </p:stCondLst>
-                            <p:childTnLst>
-                              <p:par>
-                                <p:cTn id="14" presetID="1" presetClass="entr" presetSubtype="0" fill="hold" nodeType="clickEffect">
-                                  <p:stCondLst>
-                                    <p:cond delay="0"/>
-                                  </p:stCondLst>
-                                  <p:childTnLst>
-                                    <p:set>
-                                      <p:cBhvr>
-                                        <p:cTn id="15" dur="1" fill="hold">
                                           <p:stCondLst>
                                             <p:cond delay="0"/>
                                           </p:stCondLst>
@@ -30781,6 +30747,18 @@
                                         <p:strVal val="visible"/>
                                       </p:to>
                                     </p:set>
+                                    <p:animEffect transition="in" filter="fade">
+                                      <p:cBhvr>
+                                        <p:cTn id="12" dur="500"/>
+                                        <p:tgtEl>
+                                          <p:spTgt spid="54275">
+                                            <p:txEl>
+                                              <p:pRg st="1" end="1"/>
+                                            </p:txEl>
+                                          </p:spTgt>
+                                        </p:tgtEl>
+                                      </p:cBhvr>
+                                    </p:animEffect>
                                   </p:childTnLst>
                                 </p:cTn>
                               </p:par>
@@ -30791,26 +30769,26 @@
                     </p:cTn>
                   </p:par>
                   <p:par>
-                    <p:cTn id="16" fill="hold">
+                    <p:cTn id="13" fill="hold">
                       <p:stCondLst>
                         <p:cond delay="indefinite"/>
                       </p:stCondLst>
                       <p:childTnLst>
                         <p:par>
-                          <p:cTn id="17" fill="hold">
+                          <p:cTn id="14" fill="hold">
                             <p:stCondLst>
                               <p:cond delay="0"/>
                             </p:stCondLst>
                             <p:childTnLst>
                               <p:par>
-                                <p:cTn id="18" presetID="22" presetClass="entr" presetSubtype="8" fill="hold" nodeType="clickEffect">
+                                <p:cTn id="15" presetID="22" presetClass="entr" presetSubtype="8" fill="hold" nodeType="clickEffect">
                                   <p:stCondLst>
                                     <p:cond delay="0"/>
                                   </p:stCondLst>
                                   <p:childTnLst>
                                     <p:set>
                                       <p:cBhvr>
-                                        <p:cTn id="19" dur="1" fill="hold">
+                                        <p:cTn id="16" dur="1" fill="hold">
                                           <p:stCondLst>
                                             <p:cond delay="0"/>
                                           </p:stCondLst>
@@ -30828,7 +30806,7 @@
                                     </p:set>
                                     <p:animEffect transition="in" filter="wipe(left)">
                                       <p:cBhvr>
-                                        <p:cTn id="20" dur="500"/>
+                                        <p:cTn id="17" dur="1000"/>
                                         <p:tgtEl>
                                           <p:spTgt spid="15366"/>
                                         </p:tgtEl>
@@ -31089,12 +31067,12 @@
               <a:defRPr/>
             </a:pPr>
             <a:r>
-              <a:rPr lang="en-US" dirty="0" err="1"/>
-              <a:t>lec</a:t>
+              <a:rPr lang="en-US" dirty="0" err="1" smtClean="0"/>
+              <a:t>condprob</a:t>
             </a:r>
             <a:r>
               <a:rPr lang="en-US" dirty="0" smtClean="0"/>
-              <a:t> !2M.</a:t>
+              <a:t>.</a:t>
             </a:r>
             <a:fld id="{CF7919B3-9114-487F-983E-FE0A79358A75}" type="slidenum">
               <a:rPr lang="en-US" smtClean="0"/>
@@ -31211,7 +31189,7 @@
                 <a:ea typeface="+mn-ea"/>
                 <a:cs typeface="+mn-cs"/>
               </a:rPr>
-              <a:t>lec</a:t>
+              <a:t>condprob</a:t>
             </a:r>
             <a:r>
               <a:rPr kumimoji="0" lang="en-US" sz="1200" b="0" i="0" u="none" strike="noStrike" kern="1200" cap="none" spc="0" normalizeH="0" baseline="0" noProof="0" dirty="0" smtClean="0">
@@ -31228,7 +31206,7 @@
                 <a:ea typeface="+mn-ea"/>
                 <a:cs typeface="+mn-cs"/>
               </a:rPr>
-              <a:t> !2M.</a:t>
+              <a:t>.</a:t>
             </a:r>
             <a:fld id="{B9A0B45D-6AFD-413C-B761-B121FB8BE940}" type="slidenum">
               <a:rPr kumimoji="0" lang="en-US" sz="1200" b="0" i="0" u="none" strike="noStrike" kern="1200" cap="none" spc="0" normalizeH="0" baseline="0" noProof="0" smtClean="0">
@@ -31353,7 +31331,7 @@
           <a:graphicData uri="http://schemas.openxmlformats.org/presentationml/2006/ole">
             <mc:AlternateContent xmlns:mc="http://schemas.openxmlformats.org/markup-compatibility/2006">
               <mc:Choice xmlns:v="urn:schemas-microsoft-com:vml" Requires="v">
-                <p:oleObj spid="_x0000_s244794" name="Equation" r:id="rId4" imgW="292100" imgH="469900" progId="Equation.DSMT4">
+                <p:oleObj spid="_x0000_s244800" name="Equation" r:id="rId4" imgW="292100" imgH="469900" progId="Equation.DSMT4">
                   <p:embed/>
                 </p:oleObj>
               </mc:Choice>
@@ -31956,12 +31934,12 @@
               <a:defRPr/>
             </a:pPr>
             <a:r>
-              <a:rPr lang="en-US" dirty="0" err="1"/>
-              <a:t>lec</a:t>
+              <a:rPr lang="en-US" dirty="0" err="1" smtClean="0"/>
+              <a:t>condprob</a:t>
             </a:r>
             <a:r>
               <a:rPr lang="en-US" dirty="0" smtClean="0"/>
-              <a:t> !2M.</a:t>
+              <a:t>.</a:t>
             </a:r>
             <a:fld id="{CF7919B3-9114-487F-983E-FE0A79358A75}" type="slidenum">
               <a:rPr lang="en-US" smtClean="0"/>
@@ -32078,7 +32056,7 @@
                 <a:ea typeface="+mn-ea"/>
                 <a:cs typeface="+mn-cs"/>
               </a:rPr>
-              <a:t>lec</a:t>
+              <a:t>condprob</a:t>
             </a:r>
             <a:r>
               <a:rPr kumimoji="0" lang="en-US" sz="1200" b="0" i="0" u="none" strike="noStrike" kern="1200" cap="none" spc="0" normalizeH="0" baseline="0" noProof="0" dirty="0" smtClean="0">
@@ -32095,7 +32073,7 @@
                 <a:ea typeface="+mn-ea"/>
                 <a:cs typeface="+mn-cs"/>
               </a:rPr>
-              <a:t> !2M.</a:t>
+              <a:t>.</a:t>
             </a:r>
             <a:fld id="{B9A0B45D-6AFD-413C-B761-B121FB8BE940}" type="slidenum">
               <a:rPr kumimoji="0" lang="en-US" sz="1200" b="0" i="0" u="none" strike="noStrike" kern="1200" cap="none" spc="0" normalizeH="0" baseline="0" noProof="0" smtClean="0">
@@ -32164,7 +32142,7 @@
           <a:graphicData uri="http://schemas.openxmlformats.org/presentationml/2006/ole">
             <mc:AlternateContent xmlns:mc="http://schemas.openxmlformats.org/markup-compatibility/2006">
               <mc:Choice xmlns:v="urn:schemas-microsoft-com:vml" Requires="v">
-                <p:oleObj spid="_x0000_s250978" name="Equation" r:id="rId4" imgW="292100" imgH="469900" progId="Equation.DSMT4">
+                <p:oleObj spid="_x0000_s250988" name="Equation" r:id="rId4" imgW="292100" imgH="469900" progId="Equation.DSMT4">
                   <p:embed/>
                 </p:oleObj>
               </mc:Choice>
@@ -32240,7 +32218,7 @@
           <a:graphicData uri="http://schemas.openxmlformats.org/presentationml/2006/ole">
             <mc:AlternateContent xmlns:mc="http://schemas.openxmlformats.org/markup-compatibility/2006">
               <mc:Choice xmlns:v="urn:schemas-microsoft-com:vml" Requires="v">
-                <p:oleObj spid="_x0000_s250979" name="Equation" r:id="rId6" imgW="762000" imgH="469900" progId="Equation.DSMT4">
+                <p:oleObj spid="_x0000_s250989" name="Equation" r:id="rId6" imgW="762000" imgH="469900" progId="Equation.DSMT4">
                   <p:embed/>
                 </p:oleObj>
               </mc:Choice>
@@ -32507,12 +32485,12 @@
               <a:defRPr/>
             </a:pPr>
             <a:r>
-              <a:rPr lang="en-US" dirty="0" err="1"/>
-              <a:t>lec</a:t>
+              <a:rPr lang="en-US" dirty="0" err="1" smtClean="0"/>
+              <a:t>condprob</a:t>
             </a:r>
             <a:r>
               <a:rPr lang="en-US" dirty="0" smtClean="0"/>
-              <a:t> !2M.</a:t>
+              <a:t>.</a:t>
             </a:r>
             <a:fld id="{CF7919B3-9114-487F-983E-FE0A79358A75}" type="slidenum">
               <a:rPr lang="en-US" smtClean="0"/>
@@ -32629,7 +32607,7 @@
                 <a:ea typeface="+mn-ea"/>
                 <a:cs typeface="+mn-cs"/>
               </a:rPr>
-              <a:t>lec</a:t>
+              <a:t>condprob</a:t>
             </a:r>
             <a:r>
               <a:rPr kumimoji="0" lang="en-US" sz="1200" b="0" i="0" u="none" strike="noStrike" kern="1200" cap="none" spc="0" normalizeH="0" baseline="0" noProof="0" dirty="0" smtClean="0">
@@ -32646,7 +32624,7 @@
                 <a:ea typeface="+mn-ea"/>
                 <a:cs typeface="+mn-cs"/>
               </a:rPr>
-              <a:t> !2M.</a:t>
+              <a:t>.</a:t>
             </a:r>
             <a:fld id="{B9A0B45D-6AFD-413C-B761-B121FB8BE940}" type="slidenum">
               <a:rPr kumimoji="0" lang="en-US" sz="1200" b="0" i="0" u="none" strike="noStrike" kern="1200" cap="none" spc="0" normalizeH="0" baseline="0" noProof="0" smtClean="0">
@@ -32715,7 +32693,7 @@
           <a:graphicData uri="http://schemas.openxmlformats.org/presentationml/2006/ole">
             <mc:AlternateContent xmlns:mc="http://schemas.openxmlformats.org/markup-compatibility/2006">
               <mc:Choice xmlns:v="urn:schemas-microsoft-com:vml" Requires="v">
-                <p:oleObj spid="_x0000_s350222" name="Equation" r:id="rId4" imgW="292100" imgH="469900" progId="Equation.DSMT4">
+                <p:oleObj spid="_x0000_s350232" name="Equation" r:id="rId4" imgW="292100" imgH="469900" progId="Equation.DSMT4">
                   <p:embed/>
                 </p:oleObj>
               </mc:Choice>
@@ -32791,7 +32769,7 @@
           <a:graphicData uri="http://schemas.openxmlformats.org/presentationml/2006/ole">
             <mc:AlternateContent xmlns:mc="http://schemas.openxmlformats.org/markup-compatibility/2006">
               <mc:Choice xmlns:v="urn:schemas-microsoft-com:vml" Requires="v">
-                <p:oleObj spid="_x0000_s350223" name="Equation" r:id="rId6" imgW="1143000" imgH="457200" progId="Equation.DSMT4">
+                <p:oleObj spid="_x0000_s350233" name="Equation" r:id="rId6" imgW="1143000" imgH="457200" progId="Equation.DSMT4">
                   <p:embed/>
                 </p:oleObj>
               </mc:Choice>
@@ -32969,12 +32947,12 @@
               <a:defRPr/>
             </a:pPr>
             <a:r>
-              <a:rPr lang="en-US" dirty="0" err="1"/>
-              <a:t>lec</a:t>
+              <a:rPr lang="en-US" dirty="0" err="1" smtClean="0"/>
+              <a:t>condprob</a:t>
             </a:r>
             <a:r>
               <a:rPr lang="en-US" dirty="0" smtClean="0"/>
-              <a:t> !2M.</a:t>
+              <a:t>.</a:t>
             </a:r>
             <a:fld id="{B44A5F1B-240B-4E55-8EA4-F0567455291D}" type="slidenum">
               <a:rPr lang="en-US" smtClean="0"/>
@@ -33191,7 +33169,7 @@
                 <a:ea typeface="+mn-ea"/>
                 <a:cs typeface="+mn-cs"/>
               </a:rPr>
-              <a:t>lec</a:t>
+              <a:t>condprob</a:t>
             </a:r>
             <a:r>
               <a:rPr kumimoji="0" lang="en-US" sz="1200" b="0" i="0" u="none" strike="noStrike" kern="1200" cap="none" spc="0" normalizeH="0" baseline="0" noProof="0" dirty="0" smtClean="0">
@@ -33208,7 +33186,7 @@
                 <a:ea typeface="+mn-ea"/>
                 <a:cs typeface="+mn-cs"/>
               </a:rPr>
-              <a:t> !2M.</a:t>
+              <a:t>.</a:t>
             </a:r>
             <a:fld id="{B9A0B45D-6AFD-413C-B761-B121FB8BE940}" type="slidenum">
               <a:rPr kumimoji="0" lang="en-US" sz="1200" b="0" i="0" u="none" strike="noStrike" kern="1200" cap="none" spc="0" normalizeH="0" baseline="0" noProof="0" smtClean="0">
@@ -33399,17 +33377,7 @@
                 <a:latin typeface="Comic Sans MS"/>
                 <a:cs typeface="Comic Sans MS"/>
               </a:rPr>
-              <a:t>goat </a:t>
-            </a:r>
-            <a:r>
-              <a:rPr lang="en-US" sz="4800" dirty="0" smtClean="0">
-                <a:solidFill>
-                  <a:srgbClr val="A50021"/>
-                </a:solidFill>
-                <a:latin typeface="Comic Sans MS"/>
-                <a:cs typeface="Comic Sans MS"/>
-              </a:rPr>
-              <a:t>at </a:t>
+              <a:t>goat at </a:t>
             </a:r>
             <a:r>
               <a:rPr lang="en-US" sz="4800" dirty="0">
@@ -33948,12 +33916,12 @@
               <a:defRPr/>
             </a:pPr>
             <a:r>
-              <a:rPr lang="en-US" dirty="0" err="1"/>
-              <a:t>lec</a:t>
+              <a:rPr lang="en-US" dirty="0" err="1" smtClean="0"/>
+              <a:t>condprob</a:t>
             </a:r>
             <a:r>
               <a:rPr lang="en-US" dirty="0" smtClean="0"/>
-              <a:t> !2M.</a:t>
+              <a:t>.</a:t>
             </a:r>
             <a:fld id="{B44A5F1B-240B-4E55-8EA4-F0567455291D}" type="slidenum">
               <a:rPr lang="en-US" smtClean="0"/>
@@ -34148,7 +34116,7 @@
                 <a:ea typeface="+mn-ea"/>
                 <a:cs typeface="+mn-cs"/>
               </a:rPr>
-              <a:t>lec</a:t>
+              <a:t>condprob</a:t>
             </a:r>
             <a:r>
               <a:rPr kumimoji="0" lang="en-US" sz="1200" b="0" i="0" u="none" strike="noStrike" kern="1200" cap="none" spc="0" normalizeH="0" baseline="0" noProof="0" dirty="0" smtClean="0">
@@ -34165,7 +34133,7 @@
                 <a:ea typeface="+mn-ea"/>
                 <a:cs typeface="+mn-cs"/>
               </a:rPr>
-              <a:t> !2M.</a:t>
+              <a:t>.</a:t>
             </a:r>
             <a:fld id="{B9A0B45D-6AFD-413C-B761-B121FB8BE940}" type="slidenum">
               <a:rPr kumimoji="0" lang="en-US" sz="1200" b="0" i="0" u="none" strike="noStrike" kern="1200" cap="none" spc="0" normalizeH="0" baseline="0" noProof="0" smtClean="0">
@@ -38709,11 +38677,11 @@
             </a:pPr>
             <a:r>
               <a:rPr lang="en-US" dirty="0" err="1" smtClean="0"/>
-              <a:t>lec</a:t>
+              <a:t>condprob</a:t>
             </a:r>
             <a:r>
               <a:rPr lang="en-US" dirty="0" smtClean="0"/>
-              <a:t> !2M.</a:t>
+              <a:t>.</a:t>
             </a:r>
             <a:fld id="{17233D2A-0857-4415-88C1-423492E69A26}" type="slidenum">
               <a:rPr lang="en-US" smtClean="0"/>
@@ -44078,12 +44046,12 @@
               <a:defRPr/>
             </a:pPr>
             <a:r>
-              <a:rPr lang="en-US" dirty="0" err="1"/>
-              <a:t>lec</a:t>
+              <a:rPr lang="en-US" dirty="0" err="1" smtClean="0"/>
+              <a:t>condprob</a:t>
             </a:r>
             <a:r>
               <a:rPr lang="en-US" dirty="0" smtClean="0"/>
-              <a:t> !2M.</a:t>
+              <a:t>.</a:t>
             </a:r>
             <a:fld id="{CF7919B3-9114-487F-983E-FE0A79358A75}" type="slidenum">
               <a:rPr lang="en-US" smtClean="0"/>
@@ -44200,7 +44168,7 @@
                 <a:ea typeface="+mn-ea"/>
                 <a:cs typeface="+mn-cs"/>
               </a:rPr>
-              <a:t>lec</a:t>
+              <a:t>condprob</a:t>
             </a:r>
             <a:r>
               <a:rPr kumimoji="0" lang="en-US" sz="1200" b="0" i="0" u="none" strike="noStrike" kern="1200" cap="none" spc="0" normalizeH="0" baseline="0" noProof="0" dirty="0" smtClean="0">
@@ -44217,7 +44185,7 @@
                 <a:ea typeface="+mn-ea"/>
                 <a:cs typeface="+mn-cs"/>
               </a:rPr>
-              <a:t> !2M.</a:t>
+              <a:t>.</a:t>
             </a:r>
             <a:fld id="{B9A0B45D-6AFD-413C-B761-B121FB8BE940}" type="slidenum">
               <a:rPr kumimoji="0" lang="en-US" sz="1200" b="0" i="0" u="none" strike="noStrike" kern="1200" cap="none" spc="0" normalizeH="0" baseline="0" noProof="0" smtClean="0">
@@ -44455,7 +44423,7 @@
           <a:graphicData uri="http://schemas.openxmlformats.org/presentationml/2006/ole">
             <mc:AlternateContent xmlns:mc="http://schemas.openxmlformats.org/markup-compatibility/2006">
               <mc:Choice xmlns:v="urn:schemas-microsoft-com:vml" Requires="v">
-                <p:oleObj spid="_x0000_s352262" name="Equation" r:id="rId4" imgW="368300" imgH="381000" progId="Equation.DSMT4">
+                <p:oleObj spid="_x0000_s352268" name="Equation" r:id="rId4" imgW="368300" imgH="381000" progId="Equation.DSMT4">
                   <p:embed/>
                 </p:oleObj>
               </mc:Choice>
@@ -44718,12 +44686,12 @@
               <a:defRPr/>
             </a:pPr>
             <a:r>
-              <a:rPr lang="en-US" dirty="0" err="1"/>
-              <a:t>lec</a:t>
+              <a:rPr lang="en-US" dirty="0" err="1" smtClean="0"/>
+              <a:t>condprob</a:t>
             </a:r>
             <a:r>
               <a:rPr lang="en-US" dirty="0" smtClean="0"/>
-              <a:t> !2M.</a:t>
+              <a:t>.</a:t>
             </a:r>
             <a:fld id="{CF7919B3-9114-487F-983E-FE0A79358A75}" type="slidenum">
               <a:rPr lang="en-US" smtClean="0"/>
@@ -44840,7 +44808,7 @@
                 <a:ea typeface="+mn-ea"/>
                 <a:cs typeface="+mn-cs"/>
               </a:rPr>
-              <a:t>lec</a:t>
+              <a:t>condprob</a:t>
             </a:r>
             <a:r>
               <a:rPr kumimoji="0" lang="en-US" sz="1200" b="0" i="0" u="none" strike="noStrike" kern="1200" cap="none" spc="0" normalizeH="0" baseline="0" noProof="0" dirty="0" smtClean="0">
@@ -44857,7 +44825,7 @@
                 <a:ea typeface="+mn-ea"/>
                 <a:cs typeface="+mn-cs"/>
               </a:rPr>
-              <a:t> !2M.</a:t>
+              <a:t>.</a:t>
             </a:r>
             <a:fld id="{B9A0B45D-6AFD-413C-B761-B121FB8BE940}" type="slidenum">
               <a:rPr kumimoji="0" lang="en-US" sz="1200" b="0" i="0" u="none" strike="noStrike" kern="1200" cap="none" spc="0" normalizeH="0" baseline="0" noProof="0" smtClean="0">
@@ -45052,7 +45020,7 @@
           <a:graphicData uri="http://schemas.openxmlformats.org/presentationml/2006/ole">
             <mc:AlternateContent xmlns:mc="http://schemas.openxmlformats.org/markup-compatibility/2006">
               <mc:Choice xmlns:v="urn:schemas-microsoft-com:vml" Requires="v">
-                <p:oleObj spid="_x0000_s351244" name="Equation" r:id="rId4" imgW="723900" imgH="381000" progId="Equation.DSMT4">
+                <p:oleObj spid="_x0000_s351254" name="Equation" r:id="rId4" imgW="723900" imgH="381000" progId="Equation.DSMT4">
                   <p:embed/>
                 </p:oleObj>
               </mc:Choice>
@@ -45315,12 +45283,12 @@
               <a:defRPr/>
             </a:pPr>
             <a:r>
-              <a:rPr lang="en-US" dirty="0" err="1"/>
-              <a:t>lec</a:t>
+              <a:rPr lang="en-US" dirty="0" err="1" smtClean="0"/>
+              <a:t>condprob</a:t>
             </a:r>
             <a:r>
               <a:rPr lang="en-US" dirty="0" smtClean="0"/>
-              <a:t> !2M.</a:t>
+              <a:t>.</a:t>
             </a:r>
             <a:fld id="{CF7919B3-9114-487F-983E-FE0A79358A75}" type="slidenum">
               <a:rPr lang="en-US" smtClean="0"/>
@@ -45388,7 +45356,7 @@
           <a:graphicData uri="http://schemas.openxmlformats.org/presentationml/2006/ole">
             <mc:AlternateContent xmlns:mc="http://schemas.openxmlformats.org/markup-compatibility/2006">
               <mc:Choice xmlns:v="urn:schemas-microsoft-com:vml" Requires="v">
-                <p:oleObj spid="_x0000_s351245" name="Equation" r:id="rId6" imgW="977900" imgH="508000" progId="Equation.DSMT4">
+                <p:oleObj spid="_x0000_s351255" name="Equation" r:id="rId6" imgW="977900" imgH="508000" progId="Equation.DSMT4">
                   <p:embed/>
                 </p:oleObj>
               </mc:Choice>
@@ -45638,7 +45606,7 @@
                 <a:ea typeface="+mn-ea"/>
                 <a:cs typeface="+mn-cs"/>
               </a:rPr>
-              <a:t>lec</a:t>
+              <a:t>condprob</a:t>
             </a:r>
             <a:r>
               <a:rPr kumimoji="0" lang="en-US" sz="1200" b="0" i="0" u="none" strike="noStrike" kern="1200" cap="none" spc="0" normalizeH="0" baseline="0" noProof="0" dirty="0" smtClean="0">
@@ -45655,7 +45623,7 @@
                 <a:ea typeface="+mn-ea"/>
                 <a:cs typeface="+mn-cs"/>
               </a:rPr>
-              <a:t> !2M.</a:t>
+              <a:t>.</a:t>
             </a:r>
             <a:fld id="{B9A0B45D-6AFD-413C-B761-B121FB8BE940}" type="slidenum">
               <a:rPr kumimoji="0" lang="en-US" sz="1200" b="0" i="0" u="none" strike="noStrike" kern="1200" cap="none" spc="0" normalizeH="0" baseline="0" noProof="0" smtClean="0">
@@ -46035,7 +46003,7 @@
 </file>
 
 <file path=ppt/slides/slide3.xml><?xml version="1.0" encoding="utf-8"?>
-<p:sld xmlns:a="http://schemas.openxmlformats.org/drawingml/2006/main" xmlns:r="http://schemas.openxmlformats.org/officeDocument/2006/relationships" xmlns:p="http://schemas.openxmlformats.org/presentationml/2006/main" show="0">
+<p:sld xmlns:a="http://schemas.openxmlformats.org/drawingml/2006/main" xmlns:r="http://schemas.openxmlformats.org/officeDocument/2006/relationships" xmlns:p="http://schemas.openxmlformats.org/presentationml/2006/main">
   <p:cSld>
     <p:spTree>
       <p:nvGrpSpPr>
@@ -46840,7 +46808,7 @@
           <a:graphicData uri="http://schemas.openxmlformats.org/presentationml/2006/ole">
             <mc:AlternateContent xmlns:mc="http://schemas.openxmlformats.org/markup-compatibility/2006">
               <mc:Choice xmlns:v="urn:schemas-microsoft-com:vml" Requires="v">
-                <p:oleObj spid="_x0000_s22598" name="Equation" r:id="rId4" imgW="152280" imgH="215640" progId="Equation.DSMT4">
+                <p:oleObj spid="_x0000_s22604" name="Equation" r:id="rId4" imgW="152280" imgH="215640" progId="Equation.DSMT4">
                   <p:embed/>
                 </p:oleObj>
               </mc:Choice>
@@ -47007,7 +46975,7 @@
                 <a:ea typeface="+mn-ea"/>
                 <a:cs typeface="+mn-cs"/>
               </a:rPr>
-              <a:t>lec</a:t>
+              <a:t>condprob</a:t>
             </a:r>
             <a:r>
               <a:rPr kumimoji="0" lang="en-US" sz="1200" b="0" i="0" u="none" strike="noStrike" kern="1200" cap="none" spc="0" normalizeH="0" baseline="0" noProof="0" dirty="0" smtClean="0">
@@ -47024,7 +46992,7 @@
                 <a:ea typeface="+mn-ea"/>
                 <a:cs typeface="+mn-cs"/>
               </a:rPr>
-              <a:t> !2M.</a:t>
+              <a:t>.</a:t>
             </a:r>
             <a:fld id="{B9A0B45D-6AFD-413C-B761-B121FB8BE940}" type="slidenum">
               <a:rPr kumimoji="0" lang="en-US" sz="1200" b="0" i="0" u="none" strike="noStrike" kern="1200" cap="none" spc="0" normalizeH="0" baseline="0" noProof="0" smtClean="0">
@@ -47303,12 +47271,12 @@
               <a:defRPr/>
             </a:pPr>
             <a:r>
-              <a:rPr lang="en-US" dirty="0" err="1"/>
-              <a:t>lec</a:t>
+              <a:rPr lang="en-US" dirty="0" err="1" smtClean="0"/>
+              <a:t>condprob</a:t>
             </a:r>
             <a:r>
               <a:rPr lang="en-US" dirty="0" smtClean="0"/>
-              <a:t> !2M.</a:t>
+              <a:t>.</a:t>
             </a:r>
             <a:fld id="{69C46E76-9FBA-451C-AE7E-0013B121AE0D}" type="slidenum">
               <a:rPr lang="en-US" smtClean="0"/>
@@ -47380,7 +47348,7 @@
           <a:graphicData uri="http://schemas.openxmlformats.org/presentationml/2006/ole">
             <mc:AlternateContent xmlns:mc="http://schemas.openxmlformats.org/markup-compatibility/2006">
               <mc:Choice xmlns:v="urn:schemas-microsoft-com:vml" Requires="v">
-                <p:oleObj spid="_x0000_s338955" name="Equation" r:id="rId4" imgW="1066800" imgH="685800" progId="Equation.DSMT4">
+                <p:oleObj spid="_x0000_s338961" name="Equation" r:id="rId4" imgW="1066800" imgH="685800" progId="Equation.DSMT4">
                   <p:embed/>
                 </p:oleObj>
               </mc:Choice>
@@ -47499,7 +47467,7 @@
                 <a:ea typeface="+mn-ea"/>
                 <a:cs typeface="+mn-cs"/>
               </a:rPr>
-              <a:t>lec</a:t>
+              <a:t>condprob</a:t>
             </a:r>
             <a:r>
               <a:rPr kumimoji="0" lang="en-US" sz="1200" b="0" i="0" u="none" strike="noStrike" kern="1200" cap="none" spc="0" normalizeH="0" baseline="0" noProof="0" dirty="0" smtClean="0">
@@ -47516,7 +47484,7 @@
                 <a:ea typeface="+mn-ea"/>
                 <a:cs typeface="+mn-cs"/>
               </a:rPr>
-              <a:t> !2M.</a:t>
+              <a:t>.</a:t>
             </a:r>
             <a:fld id="{B9A0B45D-6AFD-413C-B761-B121FB8BE940}" type="slidenum">
               <a:rPr kumimoji="0" lang="en-US" sz="1200" b="0" i="0" u="none" strike="noStrike" kern="1200" cap="none" spc="0" normalizeH="0" baseline="0" noProof="0" smtClean="0">
@@ -47593,7 +47561,7 @@
 </file>
 
 <file path=ppt/slides/slide4.xml><?xml version="1.0" encoding="utf-8"?>
-<p:sld xmlns:a="http://schemas.openxmlformats.org/drawingml/2006/main" xmlns:r="http://schemas.openxmlformats.org/officeDocument/2006/relationships" xmlns:p="http://schemas.openxmlformats.org/presentationml/2006/main" show="0">
+<p:sld xmlns:a="http://schemas.openxmlformats.org/drawingml/2006/main" xmlns:r="http://schemas.openxmlformats.org/officeDocument/2006/relationships" xmlns:p="http://schemas.openxmlformats.org/presentationml/2006/main">
   <p:cSld>
     <p:spTree>
       <p:nvGrpSpPr>
@@ -48629,7 +48597,7 @@
           <a:graphicData uri="http://schemas.openxmlformats.org/presentationml/2006/ole">
             <mc:AlternateContent xmlns:mc="http://schemas.openxmlformats.org/markup-compatibility/2006">
               <mc:Choice xmlns:v="urn:schemas-microsoft-com:vml" Requires="v">
-                <p:oleObj spid="_x0000_s175222" name="Equation" r:id="rId4" imgW="152280" imgH="215640" progId="Equation.DSMT4">
+                <p:oleObj spid="_x0000_s175236" name="Equation" r:id="rId4" imgW="152280" imgH="215640" progId="Equation.DSMT4">
                   <p:embed/>
                 </p:oleObj>
               </mc:Choice>
@@ -48699,7 +48667,7 @@
           <a:graphicData uri="http://schemas.openxmlformats.org/presentationml/2006/ole">
             <mc:AlternateContent xmlns:mc="http://schemas.openxmlformats.org/markup-compatibility/2006">
               <mc:Choice xmlns:v="urn:schemas-microsoft-com:vml" Requires="v">
-                <p:oleObj spid="_x0000_s175223" name="Equation" r:id="rId6" imgW="152280" imgH="215640" progId="Equation.DSMT4">
+                <p:oleObj spid="_x0000_s175237" name="Equation" r:id="rId6" imgW="152280" imgH="215640" progId="Equation.DSMT4">
                   <p:embed/>
                 </p:oleObj>
               </mc:Choice>
@@ -48769,7 +48737,7 @@
           <a:graphicData uri="http://schemas.openxmlformats.org/presentationml/2006/ole">
             <mc:AlternateContent xmlns:mc="http://schemas.openxmlformats.org/markup-compatibility/2006">
               <mc:Choice xmlns:v="urn:schemas-microsoft-com:vml" Requires="v">
-                <p:oleObj spid="_x0000_s175224" name="Equation" r:id="rId7" imgW="152280" imgH="215640" progId="Equation.DSMT4">
+                <p:oleObj spid="_x0000_s175238" name="Equation" r:id="rId7" imgW="152280" imgH="215640" progId="Equation.DSMT4">
                   <p:embed/>
                 </p:oleObj>
               </mc:Choice>
@@ -48894,7 +48862,7 @@
                 <a:ea typeface="+mn-ea"/>
                 <a:cs typeface="+mn-cs"/>
               </a:rPr>
-              <a:t>lec</a:t>
+              <a:t>condprob</a:t>
             </a:r>
             <a:r>
               <a:rPr kumimoji="0" lang="en-US" sz="1200" b="0" i="0" u="none" strike="noStrike" kern="1200" cap="none" spc="0" normalizeH="0" baseline="0" noProof="0" dirty="0" smtClean="0">
@@ -48911,7 +48879,7 @@
                 <a:ea typeface="+mn-ea"/>
                 <a:cs typeface="+mn-cs"/>
               </a:rPr>
-              <a:t> !2M.</a:t>
+              <a:t>.</a:t>
             </a:r>
             <a:fld id="{B9A0B45D-6AFD-413C-B761-B121FB8BE940}" type="slidenum">
               <a:rPr kumimoji="0" lang="en-US" sz="1200" b="0" i="0" u="none" strike="noStrike" kern="1200" cap="none" spc="0" normalizeH="0" baseline="0" noProof="0" smtClean="0">
@@ -48993,7 +48961,7 @@
                             </p:stCondLst>
                             <p:childTnLst>
                               <p:par>
-                                <p:cTn id="5" presetID="22" presetClass="entr" presetSubtype="8" fill="hold" nodeType="clickEffect">
+                                <p:cTn id="5" presetID="10" presetClass="entr" presetSubtype="0" fill="hold" nodeType="clickEffect">
                                   <p:stCondLst>
                                     <p:cond delay="0"/>
                                   </p:stCondLst>
@@ -49001,6 +48969,41 @@
                                     <p:set>
                                       <p:cBhvr>
                                         <p:cTn id="6" dur="1" fill="hold">
+                                          <p:stCondLst>
+                                            <p:cond delay="0"/>
+                                          </p:stCondLst>
+                                        </p:cTn>
+                                        <p:tgtEl>
+                                          <p:spTgt spid="22548"/>
+                                        </p:tgtEl>
+                                        <p:attrNameLst>
+                                          <p:attrName>style.visibility</p:attrName>
+                                        </p:attrNameLst>
+                                      </p:cBhvr>
+                                      <p:to>
+                                        <p:strVal val="visible"/>
+                                      </p:to>
+                                    </p:set>
+                                    <p:animEffect transition="in" filter="fade">
+                                      <p:cBhvr>
+                                        <p:cTn id="7" dur="500"/>
+                                        <p:tgtEl>
+                                          <p:spTgt spid="22548"/>
+                                        </p:tgtEl>
+                                      </p:cBhvr>
+                                    </p:animEffect>
+                                  </p:childTnLst>
+                                </p:cTn>
+                              </p:par>
+                              <p:par>
+                                <p:cTn id="8" presetID="22" presetClass="entr" presetSubtype="8" fill="hold" nodeType="withEffect">
+                                  <p:stCondLst>
+                                    <p:cond delay="0"/>
+                                  </p:stCondLst>
+                                  <p:childTnLst>
+                                    <p:set>
+                                      <p:cBhvr>
+                                        <p:cTn id="9" dur="1" fill="hold">
                                           <p:stCondLst>
                                             <p:cond delay="0"/>
                                           </p:stCondLst>
@@ -49022,48 +49025,13 @@
                                     </p:set>
                                     <p:animEffect transition="in" filter="wipe(left)">
                                       <p:cBhvr>
-                                        <p:cTn id="7" dur="1000"/>
+                                        <p:cTn id="10" dur="1000"/>
                                         <p:tgtEl>
                                           <p:spTgt spid="22546">
                                             <p:txEl>
                                               <p:pRg st="1" end="1"/>
                                             </p:txEl>
                                           </p:spTgt>
-                                        </p:tgtEl>
-                                      </p:cBhvr>
-                                    </p:animEffect>
-                                  </p:childTnLst>
-                                </p:cTn>
-                              </p:par>
-                              <p:par>
-                                <p:cTn id="8" presetID="22" presetClass="entr" presetSubtype="8" fill="hold" nodeType="withEffect">
-                                  <p:stCondLst>
-                                    <p:cond delay="0"/>
-                                  </p:stCondLst>
-                                  <p:childTnLst>
-                                    <p:set>
-                                      <p:cBhvr>
-                                        <p:cTn id="9" dur="1" fill="hold">
-                                          <p:stCondLst>
-                                            <p:cond delay="0"/>
-                                          </p:stCondLst>
-                                        </p:cTn>
-                                        <p:tgtEl>
-                                          <p:spTgt spid="22548"/>
-                                        </p:tgtEl>
-                                        <p:attrNameLst>
-                                          <p:attrName>style.visibility</p:attrName>
-                                        </p:attrNameLst>
-                                      </p:cBhvr>
-                                      <p:to>
-                                        <p:strVal val="visible"/>
-                                      </p:to>
-                                    </p:set>
-                                    <p:animEffect transition="in" filter="wipe(left)">
-                                      <p:cBhvr>
-                                        <p:cTn id="10" dur="500"/>
-                                        <p:tgtEl>
-                                          <p:spTgt spid="22548"/>
                                         </p:tgtEl>
                                       </p:cBhvr>
                                     </p:animEffect>
@@ -49118,7 +49086,7 @@
                                     </p:set>
                                     <p:animEffect transition="in" filter="wipe(left)">
                                       <p:cBhvr>
-                                        <p:cTn id="15" dur="500"/>
+                                        <p:cTn id="15" dur="1000"/>
                                         <p:tgtEl>
                                           <p:spTgt spid="22546">
                                             <p:txEl>
@@ -49150,7 +49118,7 @@
                             </p:stCondLst>
                             <p:childTnLst>
                               <p:par>
-                                <p:cTn id="18" presetID="22" presetClass="entr" presetSubtype="8" fill="hold" nodeType="clickEffect">
+                                <p:cTn id="18" presetID="10" presetClass="entr" presetSubtype="0" fill="hold" nodeType="clickEffect">
                                   <p:stCondLst>
                                     <p:cond delay="0"/>
                                   </p:stCondLst>
@@ -49158,6 +49126,41 @@
                                     <p:set>
                                       <p:cBhvr>
                                         <p:cTn id="19" dur="1" fill="hold">
+                                          <p:stCondLst>
+                                            <p:cond delay="0"/>
+                                          </p:stCondLst>
+                                        </p:cTn>
+                                        <p:tgtEl>
+                                          <p:spTgt spid="22549"/>
+                                        </p:tgtEl>
+                                        <p:attrNameLst>
+                                          <p:attrName>style.visibility</p:attrName>
+                                        </p:attrNameLst>
+                                      </p:cBhvr>
+                                      <p:to>
+                                        <p:strVal val="visible"/>
+                                      </p:to>
+                                    </p:set>
+                                    <p:animEffect transition="in" filter="fade">
+                                      <p:cBhvr>
+                                        <p:cTn id="20" dur="500"/>
+                                        <p:tgtEl>
+                                          <p:spTgt spid="22549"/>
+                                        </p:tgtEl>
+                                      </p:cBhvr>
+                                    </p:animEffect>
+                                  </p:childTnLst>
+                                </p:cTn>
+                              </p:par>
+                              <p:par>
+                                <p:cTn id="21" presetID="22" presetClass="entr" presetSubtype="8" fill="hold" nodeType="withEffect">
+                                  <p:stCondLst>
+                                    <p:cond delay="0"/>
+                                  </p:stCondLst>
+                                  <p:childTnLst>
+                                    <p:set>
+                                      <p:cBhvr>
+                                        <p:cTn id="22" dur="1" fill="hold">
                                           <p:stCondLst>
                                             <p:cond delay="0"/>
                                           </p:stCondLst>
@@ -49179,48 +49182,13 @@
                                     </p:set>
                                     <p:animEffect transition="in" filter="wipe(left)">
                                       <p:cBhvr>
-                                        <p:cTn id="20" dur="500"/>
+                                        <p:cTn id="23" dur="1000"/>
                                         <p:tgtEl>
                                           <p:spTgt spid="22546">
                                             <p:txEl>
                                               <p:pRg st="3" end="3"/>
                                             </p:txEl>
                                           </p:spTgt>
-                                        </p:tgtEl>
-                                      </p:cBhvr>
-                                    </p:animEffect>
-                                  </p:childTnLst>
-                                </p:cTn>
-                              </p:par>
-                              <p:par>
-                                <p:cTn id="21" presetID="22" presetClass="entr" presetSubtype="8" fill="hold" nodeType="withEffect">
-                                  <p:stCondLst>
-                                    <p:cond delay="0"/>
-                                  </p:stCondLst>
-                                  <p:childTnLst>
-                                    <p:set>
-                                      <p:cBhvr>
-                                        <p:cTn id="22" dur="1" fill="hold">
-                                          <p:stCondLst>
-                                            <p:cond delay="0"/>
-                                          </p:stCondLst>
-                                        </p:cTn>
-                                        <p:tgtEl>
-                                          <p:spTgt spid="22549"/>
-                                        </p:tgtEl>
-                                        <p:attrNameLst>
-                                          <p:attrName>style.visibility</p:attrName>
-                                        </p:attrNameLst>
-                                      </p:cBhvr>
-                                      <p:to>
-                                        <p:strVal val="visible"/>
-                                      </p:to>
-                                    </p:set>
-                                    <p:animEffect transition="in" filter="wipe(left)">
-                                      <p:cBhvr>
-                                        <p:cTn id="23" dur="500"/>
-                                        <p:tgtEl>
-                                          <p:spTgt spid="22549"/>
                                         </p:tgtEl>
                                       </p:cBhvr>
                                     </p:animEffect>
@@ -49259,7 +49227,7 @@
 </file>
 
 <file path=ppt/slides/slide5.xml><?xml version="1.0" encoding="utf-8"?>
-<p:sld xmlns:a="http://schemas.openxmlformats.org/drawingml/2006/main" xmlns:r="http://schemas.openxmlformats.org/officeDocument/2006/relationships" xmlns:p="http://schemas.openxmlformats.org/presentationml/2006/main" show="0">
+<p:sld xmlns:a="http://schemas.openxmlformats.org/drawingml/2006/main" xmlns:r="http://schemas.openxmlformats.org/officeDocument/2006/relationships" xmlns:p="http://schemas.openxmlformats.org/presentationml/2006/main">
   <p:cSld>
     <p:spTree>
       <p:nvGrpSpPr>
@@ -49299,16 +49267,16 @@
               <a:defRPr/>
             </a:pPr>
             <a:r>
-              <a:rPr lang="en-US" dirty="0" err="1">
+              <a:rPr lang="en-US" dirty="0" err="1" smtClean="0">
                 <a:latin typeface="+mj-lt"/>
               </a:rPr>
-              <a:t>lec</a:t>
+              <a:t>condprob</a:t>
             </a:r>
             <a:r>
               <a:rPr lang="en-US" dirty="0" smtClean="0">
                 <a:latin typeface="+mj-lt"/>
               </a:rPr>
-              <a:t> !2M.</a:t>
+              <a:t>.</a:t>
             </a:r>
             <a:fld id="{FC8B8329-7D1F-46A0-BB62-0C42EB792034}" type="slidenum">
               <a:rPr lang="en-US" smtClean="0">
@@ -50931,7 +50899,7 @@
                 <a:ea typeface="+mn-ea"/>
                 <a:cs typeface="+mn-cs"/>
               </a:rPr>
-              <a:t>lec</a:t>
+              <a:t>condprob</a:t>
             </a:r>
             <a:r>
               <a:rPr kumimoji="0" lang="en-US" sz="1200" b="0" i="0" u="none" strike="noStrike" kern="1200" cap="none" spc="0" normalizeH="0" baseline="0" noProof="0" dirty="0" smtClean="0">
@@ -50948,7 +50916,7 @@
                 <a:ea typeface="+mn-ea"/>
                 <a:cs typeface="+mn-cs"/>
               </a:rPr>
-              <a:t> !2M.</a:t>
+              <a:t>.</a:t>
             </a:r>
             <a:fld id="{B9A0B45D-6AFD-413C-B761-B121FB8BE940}" type="slidenum">
               <a:rPr kumimoji="0" lang="en-US" sz="1200" b="0" i="0" u="none" strike="noStrike" kern="1200" cap="none" spc="0" normalizeH="0" baseline="0" noProof="0" smtClean="0">
@@ -55892,11 +55860,11 @@
             </a:pPr>
             <a:r>
               <a:rPr lang="en-US" dirty="0" err="1" smtClean="0"/>
-              <a:t>lec</a:t>
+              <a:t>condprob</a:t>
             </a:r>
             <a:r>
               <a:rPr lang="en-US" dirty="0" smtClean="0"/>
-              <a:t> !2M.</a:t>
+              <a:t>.</a:t>
             </a:r>
             <a:fld id="{17233D2A-0857-4415-88C1-423492E69A26}" type="slidenum">
               <a:rPr lang="en-US" smtClean="0"/>
@@ -56474,16 +56442,16 @@
               <a:defRPr/>
             </a:pPr>
             <a:r>
-              <a:rPr lang="en-US" dirty="0" err="1">
+              <a:rPr lang="en-US" dirty="0" err="1" smtClean="0">
                 <a:latin typeface="+mj-lt"/>
               </a:rPr>
-              <a:t>lec</a:t>
+              <a:t>condprob</a:t>
             </a:r>
             <a:r>
               <a:rPr lang="en-US" dirty="0" smtClean="0">
                 <a:latin typeface="+mj-lt"/>
               </a:rPr>
-              <a:t> !2M.</a:t>
+              <a:t>.</a:t>
             </a:r>
             <a:fld id="{FC8B8329-7D1F-46A0-BB62-0C42EB792034}" type="slidenum">
               <a:rPr lang="en-US" smtClean="0">
@@ -56622,7 +56590,7 @@
                 <a:ea typeface="+mn-ea"/>
                 <a:cs typeface="+mn-cs"/>
               </a:rPr>
-              <a:t>lec</a:t>
+              <a:t>condprob</a:t>
             </a:r>
             <a:r>
               <a:rPr kumimoji="0" lang="en-US" sz="1200" b="0" i="0" u="none" strike="noStrike" kern="1200" cap="none" spc="0" normalizeH="0" baseline="0" noProof="0" dirty="0" smtClean="0">
@@ -56639,7 +56607,7 @@
                 <a:ea typeface="+mn-ea"/>
                 <a:cs typeface="+mn-cs"/>
               </a:rPr>
-              <a:t> !2M.</a:t>
+              <a:t>.</a:t>
             </a:r>
             <a:fld id="{B9A0B45D-6AFD-413C-B761-B121FB8BE940}" type="slidenum">
               <a:rPr kumimoji="0" lang="en-US" sz="1200" b="0" i="0" u="none" strike="noStrike" kern="1200" cap="none" spc="0" normalizeH="0" baseline="0" noProof="0" smtClean="0">
@@ -56798,7 +56766,35 @@
                 <a:latin typeface="Comic Sans MS"/>
                 <a:cs typeface="Comic Sans MS"/>
               </a:rPr>
-              <a:t>We were reasoning about conditional probability in the way we defined are probability space in the first place</a:t>
+              <a:t>We were reasoning about conditional probability in the way we defined </a:t>
+            </a:r>
+            <a:r>
+              <a:rPr lang="en-US" sz="5400" dirty="0" smtClean="0">
+                <a:latin typeface="Comic Sans MS"/>
+                <a:cs typeface="Comic Sans MS"/>
+              </a:rPr>
+              <a:t>our </a:t>
+            </a:r>
+            <a:r>
+              <a:rPr lang="en-US" sz="5400" dirty="0">
+                <a:latin typeface="Comic Sans MS"/>
+                <a:cs typeface="Comic Sans MS"/>
+              </a:rPr>
+              <a:t>probability </a:t>
+            </a:r>
+            <a:r>
+              <a:rPr lang="en-US" sz="5400" dirty="0" smtClean="0">
+                <a:latin typeface="Comic Sans MS"/>
+                <a:cs typeface="Comic Sans MS"/>
+              </a:rPr>
+              <a:t>spaces </a:t>
+            </a:r>
+            <a:r>
+              <a:rPr lang="en-US" sz="5400" dirty="0">
+                <a:latin typeface="Comic Sans MS"/>
+                <a:cs typeface="Comic Sans MS"/>
+              </a:rPr>
+              <a:t>in the first place</a:t>
             </a:r>
             <a:r>
               <a:rPr lang="en-US" sz="5400" dirty="0" smtClean="0">
@@ -57011,12 +57007,12 @@
               <a:defRPr/>
             </a:pPr>
             <a:r>
-              <a:rPr lang="en-US" dirty="0" err="1"/>
-              <a:t>lec</a:t>
+              <a:rPr lang="en-US" dirty="0" err="1" smtClean="0"/>
+              <a:t>condprob</a:t>
             </a:r>
             <a:r>
               <a:rPr lang="en-US" dirty="0" smtClean="0"/>
-              <a:t> !2M.</a:t>
+              <a:t>.</a:t>
             </a:r>
             <a:fld id="{6243465B-1FAC-4BC8-AF6F-DE32C2D781D1}" type="slidenum">
               <a:rPr lang="en-US" smtClean="0"/>
@@ -57119,7 +57115,7 @@
           <a:graphicData uri="http://schemas.openxmlformats.org/presentationml/2006/ole">
             <mc:AlternateContent xmlns:mc="http://schemas.openxmlformats.org/markup-compatibility/2006">
               <mc:Choice xmlns:v="urn:schemas-microsoft-com:vml" Requires="v">
-                <p:oleObj spid="_x0000_s3124" name="Equation" r:id="rId4" imgW="1066800" imgH="457200" progId="Equation.DSMT4">
+                <p:oleObj spid="_x0000_s3131" name="Equation" r:id="rId4" imgW="1066800" imgH="457200" progId="Equation.DSMT4">
                   <p:embed/>
                 </p:oleObj>
               </mc:Choice>
@@ -57188,7 +57184,7 @@
                             </p:stCondLst>
                             <p:childTnLst>
                               <p:par>
-                                <p:cTn id="5" presetID="9" presetClass="entr" presetSubtype="0" fill="hold" grpId="0" nodeType="clickEffect">
+                                <p:cTn id="5" presetID="22" presetClass="entr" presetSubtype="1" fill="hold" nodeType="clickEffect">
                                   <p:stCondLst>
                                     <p:cond delay="0"/>
                                   </p:stCondLst>
@@ -57196,6 +57192,59 @@
                                     <p:set>
                                       <p:cBhvr>
                                         <p:cTn id="6" dur="1" fill="hold">
+                                          <p:stCondLst>
+                                            <p:cond delay="0"/>
+                                          </p:stCondLst>
+                                        </p:cTn>
+                                        <p:tgtEl>
+                                          <p:spTgt spid="3074"/>
+                                        </p:tgtEl>
+                                        <p:attrNameLst>
+                                          <p:attrName>style.visibility</p:attrName>
+                                        </p:attrNameLst>
+                                      </p:cBhvr>
+                                      <p:to>
+                                        <p:strVal val="visible"/>
+                                      </p:to>
+                                    </p:set>
+                                    <p:animEffect transition="in" filter="wipe(up)">
+                                      <p:cBhvr>
+                                        <p:cTn id="7" dur="1000"/>
+                                        <p:tgtEl>
+                                          <p:spTgt spid="3074"/>
+                                        </p:tgtEl>
+                                      </p:cBhvr>
+                                    </p:animEffect>
+                                  </p:childTnLst>
+                                </p:cTn>
+                              </p:par>
+                            </p:childTnLst>
+                          </p:cTn>
+                        </p:par>
+                      </p:childTnLst>
+                    </p:cTn>
+                  </p:par>
+                  <p:par>
+                    <p:cTn id="8" fill="hold">
+                      <p:stCondLst>
+                        <p:cond delay="indefinite"/>
+                      </p:stCondLst>
+                      <p:childTnLst>
+                        <p:par>
+                          <p:cTn id="9" fill="hold">
+                            <p:stCondLst>
+                              <p:cond delay="0"/>
+                            </p:stCondLst>
+                            <p:childTnLst>
+                              <p:par>
+                                <p:cTn id="10" presetID="9" presetClass="entr" presetSubtype="0" fill="hold" grpId="0" nodeType="clickEffect">
+                                  <p:stCondLst>
+                                    <p:cond delay="0"/>
+                                  </p:stCondLst>
+                                  <p:childTnLst>
+                                    <p:set>
+                                      <p:cBhvr>
+                                        <p:cTn id="11" dur="1" fill="hold">
                                           <p:stCondLst>
                                             <p:cond delay="0"/>
                                           </p:stCondLst>
@@ -57213,7 +57262,7 @@
                                     </p:set>
                                     <p:animEffect transition="in" filter="dissolve">
                                       <p:cBhvr>
-                                        <p:cTn id="7" dur="500"/>
+                                        <p:cTn id="12" dur="500"/>
                                         <p:tgtEl>
                                           <p:spTgt spid="3077"/>
                                         </p:tgtEl>
@@ -57297,16 +57346,16 @@
               <a:defRPr/>
             </a:pPr>
             <a:r>
-              <a:rPr lang="en-US" dirty="0" err="1">
+              <a:rPr lang="en-US" dirty="0" err="1" smtClean="0">
                 <a:latin typeface="+mj-lt"/>
               </a:rPr>
-              <a:t>lec</a:t>
+              <a:t>condprob</a:t>
             </a:r>
             <a:r>
               <a:rPr lang="en-US" dirty="0" smtClean="0">
                 <a:latin typeface="+mj-lt"/>
               </a:rPr>
-              <a:t> !2M.</a:t>
+              <a:t>.</a:t>
             </a:r>
             <a:fld id="{FC8B8329-7D1F-46A0-BB62-0C42EB792034}" type="slidenum">
               <a:rPr lang="en-US" smtClean="0">
@@ -57445,7 +57494,7 @@
                 <a:ea typeface="+mn-ea"/>
                 <a:cs typeface="+mn-cs"/>
               </a:rPr>
-              <a:t>lec</a:t>
+              <a:t>condprob</a:t>
             </a:r>
             <a:r>
               <a:rPr kumimoji="0" lang="en-US" sz="1200" b="0" i="0" u="none" strike="noStrike" kern="1200" cap="none" spc="0" normalizeH="0" baseline="0" noProof="0" dirty="0" smtClean="0">
@@ -57462,7 +57511,7 @@
                 <a:ea typeface="+mn-ea"/>
                 <a:cs typeface="+mn-cs"/>
               </a:rPr>
-              <a:t> !2M.</a:t>
+              <a:t>.</a:t>
             </a:r>
             <a:fld id="{B9A0B45D-6AFD-413C-B761-B121FB8BE940}" type="slidenum">
               <a:rPr kumimoji="0" lang="en-US" sz="1200" b="0" i="0" u="none" strike="noStrike" kern="1200" cap="none" spc="0" normalizeH="0" baseline="0" noProof="0" smtClean="0">

</xml_diff>

<commit_message>
add cp14m, edit prob-conditional conditional-monty.pptx
</commit_message>
<xml_diff>
--- a/spring13/slides13/prob-conditional.pptx
+++ b/spring13/slides13/prob-conditional.pptx
@@ -3856,25 +3856,7 @@
                 </a:solidFill>
                 <a:latin typeface="Comic Sans MS" pitchFamily="66" charset="0"/>
               </a:rPr>
-              <a:t>B</a:t>
-            </a:r>
-            <a:r>
-              <a:rPr lang="en-US" sz="4800" dirty="0" smtClean="0">
-                <a:solidFill>
-                  <a:srgbClr val="0000CC"/>
-                </a:solidFill>
-                <a:latin typeface="Comic Sans MS" pitchFamily="66" charset="0"/>
-              </a:rPr>
-              <a:t>|</a:t>
-            </a:r>
-            <a:r>
-              <a:rPr lang="en-US" sz="4800" dirty="0" smtClean="0">
-                <a:solidFill>
-                  <a:srgbClr val="0000CC"/>
-                </a:solidFill>
-                <a:latin typeface="Comic Sans MS" pitchFamily="66" charset="0"/>
-              </a:rPr>
-              <a:t>A]</a:t>
+              <a:t>B|A]</a:t>
             </a:r>
             <a:r>
               <a:rPr lang="en-US" sz="4800" dirty="0" smtClean="0">
@@ -4043,7 +4025,7 @@
           <p:nvPr>
             <p:extLst>
               <p:ext uri="{D42A27DB-BD31-4B8C-83A1-F6EECF244321}">
-                <p14:modId xmlns:p14="http://schemas.microsoft.com/office/powerpoint/2010/main" val="2770076359"/>
+                <p14:modId xmlns:p14="http://schemas.microsoft.com/office/powerpoint/2010/main" val="4133252461"/>
               </p:ext>
             </p:extLst>
           </p:nvPr>
@@ -4056,7 +4038,7 @@
           <a:graphicData uri="http://schemas.openxmlformats.org/presentationml/2006/ole">
             <mc:AlternateContent xmlns:mc="http://schemas.openxmlformats.org/markup-compatibility/2006">
               <mc:Choice xmlns:v="urn:schemas-microsoft-com:vml" Requires="v">
-                <p:oleObj spid="_x0000_s2118" name="Equation" r:id="rId4" imgW="1600200" imgH="495300" progId="Equation.DSMT4">
+                <p:oleObj spid="_x0000_s2124" name="Equation" r:id="rId4" imgW="1600200" imgH="495300" progId="Equation.DSMT4">
                   <p:embed/>
                 </p:oleObj>
               </mc:Choice>
@@ -4350,7 +4332,7 @@
                                     </p:set>
                                     <p:animEffect transition="in" filter="wipe(left)">
                                       <p:cBhvr>
-                                        <p:cTn id="7" dur="500"/>
+                                        <p:cTn id="7" dur="1000"/>
                                         <p:tgtEl>
                                           <p:spTgt spid="2050"/>
                                         </p:tgtEl>
@@ -4362,21 +4344,30 @@
                             </p:childTnLst>
                           </p:cTn>
                         </p:par>
+                      </p:childTnLst>
+                    </p:cTn>
+                  </p:par>
+                  <p:par>
+                    <p:cTn id="8" fill="hold">
+                      <p:stCondLst>
+                        <p:cond delay="indefinite"/>
+                      </p:stCondLst>
+                      <p:childTnLst>
                         <p:par>
-                          <p:cTn id="8" fill="hold">
+                          <p:cTn id="9" fill="hold">
                             <p:stCondLst>
-                              <p:cond delay="500"/>
+                              <p:cond delay="0"/>
                             </p:stCondLst>
                             <p:childTnLst>
                               <p:par>
-                                <p:cTn id="9" presetID="15" presetClass="entr" presetSubtype="0" fill="hold" grpId="0" nodeType="afterEffect">
+                                <p:cTn id="10" presetID="10" presetClass="entr" presetSubtype="0" fill="hold" grpId="1" nodeType="clickEffect">
                                   <p:stCondLst>
                                     <p:cond delay="0"/>
                                   </p:stCondLst>
                                   <p:childTnLst>
                                     <p:set>
                                       <p:cBhvr>
-                                        <p:cTn id="10" dur="1" fill="hold">
+                                        <p:cTn id="11" dur="1" fill="hold">
                                           <p:stCondLst>
                                             <p:cond delay="0"/>
                                           </p:stCondLst>
@@ -4392,98 +4383,14 @@
                                         <p:strVal val="visible"/>
                                       </p:to>
                                     </p:set>
-                                    <p:anim calcmode="lin" valueType="num">
+                                    <p:animEffect transition="in" filter="fade">
                                       <p:cBhvr>
-                                        <p:cTn id="11" dur="1000" fill="hold"/>
+                                        <p:cTn id="12" dur="500"/>
                                         <p:tgtEl>
                                           <p:spTgt spid="94219"/>
                                         </p:tgtEl>
-                                        <p:attrNameLst>
-                                          <p:attrName>ppt_w</p:attrName>
-                                        </p:attrNameLst>
                                       </p:cBhvr>
-                                      <p:tavLst>
-                                        <p:tav tm="0">
-                                          <p:val>
-                                            <p:fltVal val="0"/>
-                                          </p:val>
-                                        </p:tav>
-                                        <p:tav tm="100000">
-                                          <p:val>
-                                            <p:strVal val="#ppt_w"/>
-                                          </p:val>
-                                        </p:tav>
-                                      </p:tavLst>
-                                    </p:anim>
-                                    <p:anim calcmode="lin" valueType="num">
-                                      <p:cBhvr>
-                                        <p:cTn id="12" dur="1000" fill="hold"/>
-                                        <p:tgtEl>
-                                          <p:spTgt spid="94219"/>
-                                        </p:tgtEl>
-                                        <p:attrNameLst>
-                                          <p:attrName>ppt_h</p:attrName>
-                                        </p:attrNameLst>
-                                      </p:cBhvr>
-                                      <p:tavLst>
-                                        <p:tav tm="0">
-                                          <p:val>
-                                            <p:fltVal val="0"/>
-                                          </p:val>
-                                        </p:tav>
-                                        <p:tav tm="100000">
-                                          <p:val>
-                                            <p:strVal val="#ppt_h"/>
-                                          </p:val>
-                                        </p:tav>
-                                      </p:tavLst>
-                                    </p:anim>
-                                    <p:anim calcmode="lin" valueType="num">
-                                      <p:cBhvr>
-                                        <p:cTn id="13" dur="1000" fill="hold"/>
-                                        <p:tgtEl>
-                                          <p:spTgt spid="94219"/>
-                                        </p:tgtEl>
-                                        <p:attrNameLst>
-                                          <p:attrName>ppt_x</p:attrName>
-                                        </p:attrNameLst>
-                                      </p:cBhvr>
-                                      <p:tavLst>
-                                        <p:tav tm="0" fmla="#ppt_x+(cos(-2*pi*(1-$))*-#ppt_x-sin(-2*pi*(1-$))*(1-#ppt_y))*(1-$)">
-                                          <p:val>
-                                            <p:fltVal val="0"/>
-                                          </p:val>
-                                        </p:tav>
-                                        <p:tav tm="100000">
-                                          <p:val>
-                                            <p:fltVal val="1"/>
-                                          </p:val>
-                                        </p:tav>
-                                      </p:tavLst>
-                                    </p:anim>
-                                    <p:anim calcmode="lin" valueType="num">
-                                      <p:cBhvr>
-                                        <p:cTn id="14" dur="1000" fill="hold"/>
-                                        <p:tgtEl>
-                                          <p:spTgt spid="94219"/>
-                                        </p:tgtEl>
-                                        <p:attrNameLst>
-                                          <p:attrName>ppt_y</p:attrName>
-                                        </p:attrNameLst>
-                                      </p:cBhvr>
-                                      <p:tavLst>
-                                        <p:tav tm="0" fmla="#ppt_y+(sin(-2*pi*(1-$))*-#ppt_x+cos(-2*pi*(1-$))*(1-#ppt_y))*(1-$)">
-                                          <p:val>
-                                            <p:fltVal val="0"/>
-                                          </p:val>
-                                        </p:tav>
-                                        <p:tav tm="100000">
-                                          <p:val>
-                                            <p:fltVal val="1"/>
-                                          </p:val>
-                                        </p:tav>
-                                      </p:tavLst>
-                                    </p:anim>
+                                    </p:animEffect>
                                   </p:childTnLst>
                                 </p:cTn>
                               </p:par>
@@ -4515,7 +4422,7 @@
       </p:par>
     </p:tnLst>
     <p:bldLst>
-      <p:bldP spid="94219" grpId="0" animBg="1"/>
+      <p:bldP spid="94219" grpId="1" animBg="1"/>
     </p:bldLst>
   </p:timing>
 </p:sld>
@@ -4547,25 +4454,25 @@
           <p:nvPr>
             <p:extLst>
               <p:ext uri="{D42A27DB-BD31-4B8C-83A1-F6EECF244321}">
-                <p14:modId xmlns:p14="http://schemas.microsoft.com/office/powerpoint/2010/main" val="1319494294"/>
+                <p14:modId xmlns:p14="http://schemas.microsoft.com/office/powerpoint/2010/main" val="1000361864"/>
               </p:ext>
             </p:extLst>
           </p:nvPr>
         </p:nvGraphicFramePr>
         <p:xfrm>
-          <a:off x="371475" y="1631950"/>
-          <a:ext cx="8101013" cy="3703638"/>
+          <a:off x="1186016" y="1630277"/>
+          <a:ext cx="5765800" cy="1165225"/>
         </p:xfrm>
         <a:graphic>
           <a:graphicData uri="http://schemas.openxmlformats.org/presentationml/2006/ole">
             <mc:AlternateContent xmlns:mc="http://schemas.openxmlformats.org/markup-compatibility/2006">
               <mc:Choice xmlns:v="urn:schemas-microsoft-com:vml" Requires="v">
-                <p:oleObj spid="_x0000_s333879" name="Equation" r:id="rId4" imgW="1498600" imgH="685800" progId="Equation.DSMT4">
+                <p:oleObj spid="_x0000_s333888" name="Equation" r:id="rId4" imgW="1066800" imgH="215900" progId="Equation.DSMT4">
                   <p:embed/>
                 </p:oleObj>
               </mc:Choice>
               <mc:Fallback>
-                <p:oleObj name="Equation" r:id="rId4" imgW="1498600" imgH="685800" progId="Equation.DSMT4">
+                <p:oleObj name="Equation" r:id="rId4" imgW="1066800" imgH="215900" progId="Equation.DSMT4">
                   <p:embed/>
                   <p:pic>
                     <p:nvPicPr>
@@ -4584,8 +4491,8 @@
                     </p:blipFill>
                     <p:spPr bwMode="auto">
                       <a:xfrm>
-                        <a:off x="371475" y="1631950"/>
-                        <a:ext cx="8101013" cy="3703638"/>
+                        <a:off x="1186016" y="1630277"/>
+                        <a:ext cx="5765800" cy="1165225"/>
                       </a:xfrm>
                       <a:prstGeom prst="rect">
                         <a:avLst/>
@@ -4710,6 +4617,120 @@
           </a:p>
         </p:txBody>
       </p:sp>
+      <p:graphicFrame>
+        <p:nvGraphicFramePr>
+          <p:cNvPr id="2" name="Object 1"/>
+          <p:cNvGraphicFramePr>
+            <a:graphicFrameLocks noChangeAspect="1"/>
+          </p:cNvGraphicFramePr>
+          <p:nvPr>
+            <p:extLst>
+              <p:ext uri="{D42A27DB-BD31-4B8C-83A1-F6EECF244321}">
+                <p14:modId xmlns:p14="http://schemas.microsoft.com/office/powerpoint/2010/main" val="3015514834"/>
+              </p:ext>
+            </p:extLst>
+          </p:nvPr>
+        </p:nvGraphicFramePr>
+        <p:xfrm>
+          <a:off x="1920450" y="2804871"/>
+          <a:ext cx="5466786" cy="1251433"/>
+        </p:xfrm>
+        <a:graphic>
+          <a:graphicData uri="http://schemas.openxmlformats.org/presentationml/2006/ole">
+            <mc:AlternateContent xmlns:mc="http://schemas.openxmlformats.org/markup-compatibility/2006">
+              <mc:Choice xmlns:v="urn:schemas-microsoft-com:vml" Requires="v">
+                <p:oleObj spid="_x0000_s333889" name="Equation" r:id="rId6" imgW="1054100" imgH="241300" progId="Equation.DSMT4">
+                  <p:embed/>
+                </p:oleObj>
+              </mc:Choice>
+              <mc:Fallback>
+                <p:oleObj name="Equation" r:id="rId6" imgW="1054100" imgH="241300" progId="Equation.DSMT4">
+                  <p:embed/>
+                  <p:pic>
+                    <p:nvPicPr>
+                      <p:cNvPr id="0" name=""/>
+                      <p:cNvPicPr/>
+                      <p:nvPr/>
+                    </p:nvPicPr>
+                    <p:blipFill>
+                      <a:blip r:embed="rId7"/>
+                      <a:stretch>
+                        <a:fillRect/>
+                      </a:stretch>
+                    </p:blipFill>
+                    <p:spPr>
+                      <a:xfrm>
+                        <a:off x="1920450" y="2804871"/>
+                        <a:ext cx="5466786" cy="1251433"/>
+                      </a:xfrm>
+                      <a:prstGeom prst="rect">
+                        <a:avLst/>
+                      </a:prstGeom>
+                    </p:spPr>
+                  </p:pic>
+                </p:oleObj>
+              </mc:Fallback>
+            </mc:AlternateContent>
+          </a:graphicData>
+        </a:graphic>
+      </p:graphicFrame>
+      <p:graphicFrame>
+        <p:nvGraphicFramePr>
+          <p:cNvPr id="3" name="Object 2"/>
+          <p:cNvGraphicFramePr>
+            <a:graphicFrameLocks noChangeAspect="1"/>
+          </p:cNvGraphicFramePr>
+          <p:nvPr>
+            <p:extLst>
+              <p:ext uri="{D42A27DB-BD31-4B8C-83A1-F6EECF244321}">
+                <p14:modId xmlns:p14="http://schemas.microsoft.com/office/powerpoint/2010/main" val="282010049"/>
+              </p:ext>
+            </p:extLst>
+          </p:nvPr>
+        </p:nvGraphicFramePr>
+        <p:xfrm>
+          <a:off x="3420716" y="3983106"/>
+          <a:ext cx="4839940" cy="1227027"/>
+        </p:xfrm>
+        <a:graphic>
+          <a:graphicData uri="http://schemas.openxmlformats.org/presentationml/2006/ole">
+            <mc:AlternateContent xmlns:mc="http://schemas.openxmlformats.org/markup-compatibility/2006">
+              <mc:Choice xmlns:v="urn:schemas-microsoft-com:vml" Requires="v">
+                <p:oleObj spid="_x0000_s333890" name="Equation" r:id="rId8" imgW="901700" imgH="228600" progId="Equation.DSMT4">
+                  <p:embed/>
+                </p:oleObj>
+              </mc:Choice>
+              <mc:Fallback>
+                <p:oleObj name="Equation" r:id="rId8" imgW="901700" imgH="228600" progId="Equation.DSMT4">
+                  <p:embed/>
+                  <p:pic>
+                    <p:nvPicPr>
+                      <p:cNvPr id="0" name=""/>
+                      <p:cNvPicPr/>
+                      <p:nvPr/>
+                    </p:nvPicPr>
+                    <p:blipFill>
+                      <a:blip r:embed="rId9"/>
+                      <a:stretch>
+                        <a:fillRect/>
+                      </a:stretch>
+                    </p:blipFill>
+                    <p:spPr>
+                      <a:xfrm>
+                        <a:off x="3420716" y="3983106"/>
+                        <a:ext cx="4839940" cy="1227027"/>
+                      </a:xfrm>
+                      <a:prstGeom prst="rect">
+                        <a:avLst/>
+                      </a:prstGeom>
+                    </p:spPr>
+                  </p:pic>
+                </p:oleObj>
+              </mc:Fallback>
+            </mc:AlternateContent>
+          </a:graphicData>
+        </a:graphic>
+      </p:graphicFrame>
     </p:spTree>
     <p:extLst>
       <p:ext uri="{BB962C8B-B14F-4D97-AF65-F5344CB8AC3E}">
@@ -4726,9 +4747,194 @@
   <p:timing>
     <p:tnLst>
       <p:par>
-        <p:cTn xmlns:p14="http://schemas.microsoft.com/office/powerpoint/2010/main" id="1" dur="indefinite" restart="never" nodeType="tmRoot"/>
+        <p:cTn xmlns:p14="http://schemas.microsoft.com/office/powerpoint/2010/main" id="1" dur="indefinite" restart="never" nodeType="tmRoot">
+          <p:childTnLst>
+            <p:seq concurrent="1" nextAc="seek">
+              <p:cTn id="2" dur="indefinite" nodeType="mainSeq">
+                <p:childTnLst>
+                  <p:par>
+                    <p:cTn id="3" fill="hold">
+                      <p:stCondLst>
+                        <p:cond delay="indefinite"/>
+                      </p:stCondLst>
+                      <p:childTnLst>
+                        <p:par>
+                          <p:cTn id="4" fill="hold">
+                            <p:stCondLst>
+                              <p:cond delay="0"/>
+                            </p:stCondLst>
+                            <p:childTnLst>
+                              <p:par>
+                                <p:cTn id="5" presetID="22" presetClass="entr" presetSubtype="8" fill="hold" nodeType="clickEffect">
+                                  <p:stCondLst>
+                                    <p:cond delay="0"/>
+                                  </p:stCondLst>
+                                  <p:childTnLst>
+                                    <p:set>
+                                      <p:cBhvr>
+                                        <p:cTn id="6" dur="1" fill="hold">
+                                          <p:stCondLst>
+                                            <p:cond delay="0"/>
+                                          </p:stCondLst>
+                                        </p:cTn>
+                                        <p:tgtEl>
+                                          <p:spTgt spid="2"/>
+                                        </p:tgtEl>
+                                        <p:attrNameLst>
+                                          <p:attrName>style.visibility</p:attrName>
+                                        </p:attrNameLst>
+                                      </p:cBhvr>
+                                      <p:to>
+                                        <p:strVal val="visible"/>
+                                      </p:to>
+                                    </p:set>
+                                    <p:animEffect transition="in" filter="wipe(left)">
+                                      <p:cBhvr>
+                                        <p:cTn id="7" dur="1000"/>
+                                        <p:tgtEl>
+                                          <p:spTgt spid="2"/>
+                                        </p:tgtEl>
+                                      </p:cBhvr>
+                                    </p:animEffect>
+                                  </p:childTnLst>
+                                </p:cTn>
+                              </p:par>
+                            </p:childTnLst>
+                          </p:cTn>
+                        </p:par>
+                      </p:childTnLst>
+                    </p:cTn>
+                  </p:par>
+                  <p:par>
+                    <p:cTn id="8" fill="hold">
+                      <p:stCondLst>
+                        <p:cond delay="indefinite"/>
+                      </p:stCondLst>
+                      <p:childTnLst>
+                        <p:par>
+                          <p:cTn id="9" fill="hold">
+                            <p:stCondLst>
+                              <p:cond delay="0"/>
+                            </p:stCondLst>
+                            <p:childTnLst>
+                              <p:par>
+                                <p:cTn id="10" presetID="22" presetClass="entr" presetSubtype="8" fill="hold" nodeType="clickEffect">
+                                  <p:stCondLst>
+                                    <p:cond delay="0"/>
+                                  </p:stCondLst>
+                                  <p:childTnLst>
+                                    <p:set>
+                                      <p:cBhvr>
+                                        <p:cTn id="11" dur="1" fill="hold">
+                                          <p:stCondLst>
+                                            <p:cond delay="0"/>
+                                          </p:stCondLst>
+                                        </p:cTn>
+                                        <p:tgtEl>
+                                          <p:spTgt spid="3"/>
+                                        </p:tgtEl>
+                                        <p:attrNameLst>
+                                          <p:attrName>style.visibility</p:attrName>
+                                        </p:attrNameLst>
+                                      </p:cBhvr>
+                                      <p:to>
+                                        <p:strVal val="visible"/>
+                                      </p:to>
+                                    </p:set>
+                                    <p:animEffect transition="in" filter="wipe(left)">
+                                      <p:cBhvr>
+                                        <p:cTn id="12" dur="1000"/>
+                                        <p:tgtEl>
+                                          <p:spTgt spid="3"/>
+                                        </p:tgtEl>
+                                      </p:cBhvr>
+                                    </p:animEffect>
+                                  </p:childTnLst>
+                                </p:cTn>
+                              </p:par>
+                            </p:childTnLst>
+                          </p:cTn>
+                        </p:par>
+                      </p:childTnLst>
+                    </p:cTn>
+                  </p:par>
+                  <p:par>
+                    <p:cTn id="13" fill="hold">
+                      <p:stCondLst>
+                        <p:cond delay="indefinite"/>
+                      </p:stCondLst>
+                      <p:childTnLst>
+                        <p:par>
+                          <p:cTn id="14" fill="hold">
+                            <p:stCondLst>
+                              <p:cond delay="0"/>
+                            </p:stCondLst>
+                            <p:childTnLst>
+                              <p:par>
+                                <p:cTn id="15" presetID="10" presetClass="entr" presetSubtype="0" fill="hold" grpId="0" nodeType="clickEffect">
+                                  <p:stCondLst>
+                                    <p:cond delay="0"/>
+                                  </p:stCondLst>
+                                  <p:childTnLst>
+                                    <p:set>
+                                      <p:cBhvr>
+                                        <p:cTn id="16" dur="1" fill="hold">
+                                          <p:stCondLst>
+                                            <p:cond delay="0"/>
+                                          </p:stCondLst>
+                                        </p:cTn>
+                                        <p:tgtEl>
+                                          <p:spTgt spid="3077"/>
+                                        </p:tgtEl>
+                                        <p:attrNameLst>
+                                          <p:attrName>style.visibility</p:attrName>
+                                        </p:attrNameLst>
+                                      </p:cBhvr>
+                                      <p:to>
+                                        <p:strVal val="visible"/>
+                                      </p:to>
+                                    </p:set>
+                                    <p:animEffect transition="in" filter="fade">
+                                      <p:cBhvr>
+                                        <p:cTn id="17" dur="500"/>
+                                        <p:tgtEl>
+                                          <p:spTgt spid="3077"/>
+                                        </p:tgtEl>
+                                      </p:cBhvr>
+                                    </p:animEffect>
+                                  </p:childTnLst>
+                                </p:cTn>
+                              </p:par>
+                            </p:childTnLst>
+                          </p:cTn>
+                        </p:par>
+                      </p:childTnLst>
+                    </p:cTn>
+                  </p:par>
+                </p:childTnLst>
+              </p:cTn>
+              <p:prevCondLst>
+                <p:cond evt="onPrev" delay="0">
+                  <p:tgtEl>
+                    <p:sldTgt/>
+                  </p:tgtEl>
+                </p:cond>
+              </p:prevCondLst>
+              <p:nextCondLst>
+                <p:cond evt="onNext" delay="0">
+                  <p:tgtEl>
+                    <p:sldTgt/>
+                  </p:tgtEl>
+                </p:cond>
+              </p:nextCondLst>
+            </p:seq>
+          </p:childTnLst>
+        </p:cTn>
       </p:par>
     </p:tnLst>
+    <p:bldLst>
+      <p:bldP spid="3077" grpId="0" animBg="1"/>
+    </p:bldLst>
   </p:timing>
 </p:sld>
 </file>
@@ -4961,7 +5167,7 @@
           <a:graphicData uri="http://schemas.openxmlformats.org/presentationml/2006/ole">
             <mc:AlternateContent xmlns:mc="http://schemas.openxmlformats.org/markup-compatibility/2006">
               <mc:Choice xmlns:v="urn:schemas-microsoft-com:vml" Requires="v">
-                <p:oleObj spid="_x0000_s1142" name="Equation" r:id="rId4" imgW="2222500" imgH="635000" progId="Equation.DSMT4">
+                <p:oleObj spid="_x0000_s1149" name="Equation" r:id="rId4" imgW="2222500" imgH="635000" progId="Equation.DSMT4">
                   <p:embed/>
                 </p:oleObj>
               </mc:Choice>
@@ -5025,7 +5231,7 @@
           <a:graphicData uri="http://schemas.openxmlformats.org/presentationml/2006/ole">
             <mc:AlternateContent xmlns:mc="http://schemas.openxmlformats.org/markup-compatibility/2006">
               <mc:Choice xmlns:v="urn:schemas-microsoft-com:vml" Requires="v">
-                <p:oleObj spid="_x0000_s1143" name="Equation" r:id="rId6" imgW="1117440" imgH="533160" progId="Equation.DSMT4">
+                <p:oleObj spid="_x0000_s1150" name="Equation" r:id="rId6" imgW="1117440" imgH="533160" progId="Equation.DSMT4">
                   <p:embed/>
                 </p:oleObj>
               </mc:Choice>
@@ -6076,7 +6282,7 @@
           <a:graphicData uri="http://schemas.openxmlformats.org/presentationml/2006/ole">
             <mc:AlternateContent xmlns:mc="http://schemas.openxmlformats.org/markup-compatibility/2006">
               <mc:Choice xmlns:v="urn:schemas-microsoft-com:vml" Requires="v">
-                <p:oleObj spid="_x0000_s22622" name="Equation" r:id="rId4" imgW="152280" imgH="215640" progId="Equation.DSMT4">
+                <p:oleObj spid="_x0000_s22629" name="Equation" r:id="rId4" imgW="152280" imgH="215640" progId="Equation.DSMT4">
                   <p:embed/>
                 </p:oleObj>
               </mc:Choice>
@@ -6280,20 +6486,20 @@
           <p:nvPr>
             <p:extLst>
               <p:ext uri="{D42A27DB-BD31-4B8C-83A1-F6EECF244321}">
-                <p14:modId xmlns:p14="http://schemas.microsoft.com/office/powerpoint/2010/main" val="3512760098"/>
+                <p14:modId xmlns:p14="http://schemas.microsoft.com/office/powerpoint/2010/main" val="196746397"/>
               </p:ext>
             </p:extLst>
           </p:nvPr>
         </p:nvGraphicFramePr>
         <p:xfrm>
-          <a:off x="712788" y="3094038"/>
+          <a:off x="564468" y="3094038"/>
           <a:ext cx="5332412" cy="1552575"/>
         </p:xfrm>
         <a:graphic>
           <a:graphicData uri="http://schemas.openxmlformats.org/presentationml/2006/ole">
             <mc:AlternateContent xmlns:mc="http://schemas.openxmlformats.org/markup-compatibility/2006">
               <mc:Choice xmlns:v="urn:schemas-microsoft-com:vml" Requires="v">
-                <p:oleObj spid="_x0000_s22623" name="Equation" r:id="rId6" imgW="1701800" imgH="495300" progId="Equation.DSMT4">
+                <p:oleObj spid="_x0000_s22630" name="Equation" r:id="rId6" imgW="1701800" imgH="495300" progId="Equation.DSMT4">
                   <p:embed/>
                 </p:oleObj>
               </mc:Choice>
@@ -6314,7 +6520,7 @@
                     </p:blipFill>
                     <p:spPr>
                       <a:xfrm>
-                        <a:off x="712788" y="3094038"/>
+                        <a:off x="564468" y="3094038"/>
                         <a:ext cx="5332412" cy="1552575"/>
                       </a:xfrm>
                       <a:prstGeom prst="rect">
@@ -6333,8 +6539,8 @@
   <p:clrMapOvr>
     <a:masterClrMapping/>
   </p:clrMapOvr>
-  <p:transition xmlns:p14="http://schemas.microsoft.com/office/powerpoint/2010/main" spd="slow">
-    <p:fade thruBlk="1"/>
+  <p:transition xmlns:p14="http://schemas.microsoft.com/office/powerpoint/2010/main" advClick="0">
+    <p:fade/>
   </p:transition>
   <p:timing>
     <p:tnLst>
@@ -7009,7 +7215,7 @@
           <a:graphicData uri="http://schemas.openxmlformats.org/presentationml/2006/ole">
             <mc:AlternateContent xmlns:mc="http://schemas.openxmlformats.org/markup-compatibility/2006">
               <mc:Choice xmlns:v="urn:schemas-microsoft-com:vml" Requires="v">
-                <p:oleObj spid="_x0000_s334865" name="Equation" r:id="rId4" imgW="152280" imgH="215640" progId="Equation.DSMT4">
+                <p:oleObj spid="_x0000_s334875" name="Equation" r:id="rId4" imgW="152280" imgH="215640" progId="Equation.DSMT4">
                   <p:embed/>
                 </p:oleObj>
               </mc:Choice>
@@ -7226,7 +7432,7 @@
           <a:graphicData uri="http://schemas.openxmlformats.org/presentationml/2006/ole">
             <mc:AlternateContent xmlns:mc="http://schemas.openxmlformats.org/markup-compatibility/2006">
               <mc:Choice xmlns:v="urn:schemas-microsoft-com:vml" Requires="v">
-                <p:oleObj spid="_x0000_s334866" name="Equation" r:id="rId6" imgW="2628900" imgH="495300" progId="Equation.DSMT4">
+                <p:oleObj spid="_x0000_s334876" name="Equation" r:id="rId6" imgW="2628900" imgH="495300" progId="Equation.DSMT4">
                   <p:embed/>
                 </p:oleObj>
               </mc:Choice>
@@ -7270,7 +7476,7 @@
           <p:nvPr>
             <p:extLst>
               <p:ext uri="{D42A27DB-BD31-4B8C-83A1-F6EECF244321}">
-                <p14:modId xmlns:p14="http://schemas.microsoft.com/office/powerpoint/2010/main" val="3020464210"/>
+                <p14:modId xmlns:p14="http://schemas.microsoft.com/office/powerpoint/2010/main" val="2457008615"/>
               </p:ext>
             </p:extLst>
           </p:nvPr>
@@ -7283,7 +7489,7 @@
           <a:graphicData uri="http://schemas.openxmlformats.org/presentationml/2006/ole">
             <mc:AlternateContent xmlns:mc="http://schemas.openxmlformats.org/markup-compatibility/2006">
               <mc:Choice xmlns:v="urn:schemas-microsoft-com:vml" Requires="v">
-                <p:oleObj spid="_x0000_s334867" name="Equation" r:id="rId8" imgW="2628900" imgH="520700" progId="Equation.DSMT4">
+                <p:oleObj spid="_x0000_s334877" name="Equation" r:id="rId8" imgW="2628900" imgH="520700" progId="Equation.DSMT4">
                   <p:embed/>
                 </p:oleObj>
               </mc:Choice>
@@ -7328,8 +7534,8 @@
   <p:clrMapOvr>
     <a:masterClrMapping/>
   </p:clrMapOvr>
-  <p:transition xmlns:p14="http://schemas.microsoft.com/office/powerpoint/2010/main" spd="slow">
-    <p:fade thruBlk="1"/>
+  <p:transition xmlns:p14="http://schemas.microsoft.com/office/powerpoint/2010/main" advClick="0">
+    <p:fade/>
   </p:transition>
   <p:timing>
     <p:tnLst>
@@ -8454,99 +8660,6 @@
       </p:grpSp>
       <p:sp>
         <p:nvSpPr>
-          <p:cNvPr id="75807" name="Text Box 31"/>
-          <p:cNvSpPr txBox="1">
-            <a:spLocks noChangeArrowheads="1"/>
-          </p:cNvSpPr>
-          <p:nvPr/>
-        </p:nvSpPr>
-        <p:spPr bwMode="auto">
-          <a:xfrm>
-            <a:off x="1763948" y="1295400"/>
-            <a:ext cx="3276600" cy="523220"/>
-          </a:xfrm>
-          <a:prstGeom prst="rect">
-            <a:avLst/>
-          </a:prstGeom>
-          <a:noFill/>
-          <a:ln w="9525">
-            <a:noFill/>
-            <a:miter lim="800000"/>
-            <a:headEnd/>
-            <a:tailEnd/>
-          </a:ln>
-        </p:spPr>
-        <p:txBody>
-          <a:bodyPr>
-            <a:spAutoFit/>
-          </a:bodyPr>
-          <a:lstStyle/>
-          <a:p>
-            <a:pPr>
-              <a:spcBef>
-                <a:spcPct val="50000"/>
-              </a:spcBef>
-              <a:defRPr/>
-            </a:pPr>
-            <a:r>
-              <a:rPr lang="en-US" sz="2800" dirty="0" err="1" smtClean="0">
-                <a:solidFill>
-                  <a:srgbClr val="0000CC"/>
-                </a:solidFill>
-                <a:latin typeface="+mj-lt"/>
-              </a:rPr>
-              <a:t>Pr</a:t>
-            </a:r>
-            <a:r>
-              <a:rPr lang="en-US" sz="2800" dirty="0" smtClean="0">
-                <a:solidFill>
-                  <a:srgbClr val="0000CC"/>
-                </a:solidFill>
-                <a:latin typeface="+mj-lt"/>
-              </a:rPr>
-              <a:t>[one </a:t>
-            </a:r>
-            <a:r>
-              <a:rPr lang="en-US" sz="2800" dirty="0">
-                <a:solidFill>
-                  <a:srgbClr val="0000CC"/>
-                </a:solidFill>
-                <a:latin typeface="+mj-lt"/>
-              </a:rPr>
-              <a:t>| </a:t>
-            </a:r>
-            <a:r>
-              <a:rPr lang="en-US" sz="2800" dirty="0" smtClean="0">
-                <a:solidFill>
-                  <a:srgbClr val="0000CC"/>
-                </a:solidFill>
-                <a:latin typeface="+mj-lt"/>
-              </a:rPr>
-              <a:t>odd] </a:t>
-            </a:r>
-            <a:r>
-              <a:rPr lang="en-US" sz="2800" dirty="0">
-                <a:solidFill>
-                  <a:srgbClr val="0000CC"/>
-                </a:solidFill>
-                <a:latin typeface="+mj-lt"/>
-              </a:rPr>
-              <a:t>=</a:t>
-            </a:r>
-            <a:r>
-              <a:rPr lang="en-US" sz="2400" dirty="0">
-                <a:solidFill>
-                  <a:srgbClr val="0000CC"/>
-                </a:solidFill>
-                <a:latin typeface="+mj-lt"/>
-              </a:rPr>
-              <a:t> </a:t>
-            </a:r>
-          </a:p>
-        </p:txBody>
-      </p:sp>
-      <p:sp>
-        <p:nvSpPr>
           <p:cNvPr id="16394" name="Text Box 34"/>
           <p:cNvSpPr txBox="1">
             <a:spLocks noChangeArrowheads="1"/>
@@ -8788,16 +8901,7 @@
                   </a:solidFill>
                   <a:latin typeface="+mj-lt"/>
                 </a:rPr>
-                <a:t>odd] </a:t>
-              </a:r>
-              <a:r>
-                <a:rPr lang="en-US" sz="2800" dirty="0" smtClean="0">
-                  <a:solidFill>
-                    <a:srgbClr val="0000CC"/>
-                  </a:solidFill>
-                  <a:latin typeface="+mj-lt"/>
-                </a:rPr>
-                <a:t>=</a:t>
+                <a:t>odd] =</a:t>
               </a:r>
               <a:endParaRPr lang="en-US" sz="2400" dirty="0">
                 <a:solidFill>
@@ -9224,6 +9328,142 @@
           </a:p>
         </p:txBody>
       </p:sp>
+      <p:grpSp>
+        <p:nvGrpSpPr>
+          <p:cNvPr id="7" name="Group 6"/>
+          <p:cNvGrpSpPr/>
+          <p:nvPr/>
+        </p:nvGrpSpPr>
+        <p:grpSpPr>
+          <a:xfrm>
+            <a:off x="1115048" y="1026541"/>
+            <a:ext cx="3556966" cy="523220"/>
+            <a:chOff x="1115048" y="1026541"/>
+            <a:chExt cx="3556966" cy="523220"/>
+          </a:xfrm>
+        </p:grpSpPr>
+        <p:sp>
+          <p:nvSpPr>
+            <p:cNvPr id="75807" name="Text Box 31"/>
+            <p:cNvSpPr txBox="1">
+              <a:spLocks noChangeArrowheads="1"/>
+            </p:cNvSpPr>
+            <p:nvPr/>
+          </p:nvSpPr>
+          <p:spPr bwMode="auto">
+            <a:xfrm>
+              <a:off x="1115048" y="1026541"/>
+              <a:ext cx="3276600" cy="523220"/>
+            </a:xfrm>
+            <a:prstGeom prst="rect">
+              <a:avLst/>
+            </a:prstGeom>
+            <a:noFill/>
+            <a:ln w="9525">
+              <a:noFill/>
+              <a:miter lim="800000"/>
+              <a:headEnd/>
+              <a:tailEnd/>
+            </a:ln>
+          </p:spPr>
+          <p:txBody>
+            <a:bodyPr>
+              <a:spAutoFit/>
+            </a:bodyPr>
+            <a:lstStyle/>
+            <a:p>
+              <a:pPr>
+                <a:spcBef>
+                  <a:spcPct val="50000"/>
+                </a:spcBef>
+                <a:defRPr/>
+              </a:pPr>
+              <a:r>
+                <a:rPr lang="en-US" sz="2800" dirty="0" err="1" smtClean="0">
+                  <a:solidFill>
+                    <a:srgbClr val="0000CC"/>
+                  </a:solidFill>
+                  <a:latin typeface="+mj-lt"/>
+                </a:rPr>
+                <a:t>Pr</a:t>
+              </a:r>
+              <a:r>
+                <a:rPr lang="en-US" sz="2800" dirty="0" smtClean="0">
+                  <a:solidFill>
+                    <a:srgbClr val="0000CC"/>
+                  </a:solidFill>
+                  <a:latin typeface="+mj-lt"/>
+                </a:rPr>
+                <a:t>[one </a:t>
+              </a:r>
+              <a:r>
+                <a:rPr lang="en-US" sz="2800" dirty="0">
+                  <a:solidFill>
+                    <a:srgbClr val="0000CC"/>
+                  </a:solidFill>
+                  <a:latin typeface="+mj-lt"/>
+                </a:rPr>
+                <a:t>| </a:t>
+              </a:r>
+              <a:r>
+                <a:rPr lang="en-US" sz="2800" dirty="0" smtClean="0">
+                  <a:solidFill>
+                    <a:srgbClr val="0000CC"/>
+                  </a:solidFill>
+                  <a:latin typeface="+mj-lt"/>
+                </a:rPr>
+                <a:t>odd] </a:t>
+              </a:r>
+              <a:r>
+                <a:rPr lang="en-US" sz="2400" dirty="0" smtClean="0">
+                  <a:solidFill>
+                    <a:srgbClr val="0000CC"/>
+                  </a:solidFill>
+                  <a:latin typeface="+mj-lt"/>
+                </a:rPr>
+                <a:t> </a:t>
+              </a:r>
+              <a:endParaRPr lang="en-US" sz="2400" dirty="0">
+                <a:solidFill>
+                  <a:srgbClr val="0000CC"/>
+                </a:solidFill>
+                <a:latin typeface="+mj-lt"/>
+              </a:endParaRPr>
+            </a:p>
+          </p:txBody>
+        </p:sp>
+        <p:cxnSp>
+          <p:nvCxnSpPr>
+            <p:cNvPr id="4" name="Curved Connector 3"/>
+            <p:cNvCxnSpPr>
+              <a:endCxn id="16404" idx="1"/>
+            </p:cNvCxnSpPr>
+            <p:nvPr/>
+          </p:nvCxnSpPr>
+          <p:spPr bwMode="auto">
+            <a:xfrm>
+              <a:off x="3837907" y="1307169"/>
+              <a:ext cx="834107" cy="240644"/>
+            </a:xfrm>
+            <a:prstGeom prst="curvedConnector3">
+              <a:avLst/>
+            </a:prstGeom>
+            <a:solidFill>
+              <a:schemeClr val="accent1"/>
+            </a:solidFill>
+            <a:ln w="44450" cap="flat" cmpd="sng" algn="ctr">
+              <a:solidFill>
+                <a:srgbClr val="0000FF"/>
+              </a:solidFill>
+              <a:prstDash val="sysDash"/>
+              <a:round/>
+              <a:headEnd type="none" w="med" len="med"/>
+              <a:tailEnd type="stealth" w="lg" len="lg"/>
+            </a:ln>
+            <a:effectLst/>
+          </p:spPr>
+        </p:cxnSp>
+      </p:grpSp>
     </p:spTree>
   </p:cSld>
   <p:clrMapOvr>
@@ -9253,7 +9493,7 @@
                             </p:stCondLst>
                             <p:childTnLst>
                               <p:par>
-                                <p:cTn id="5" presetID="22" presetClass="entr" presetSubtype="8" fill="hold" grpId="0" nodeType="clickEffect">
+                                <p:cTn id="5" presetID="10" presetClass="entr" presetSubtype="0" fill="hold" grpId="0" nodeType="clickEffect">
                                   <p:stCondLst>
                                     <p:cond delay="0"/>
                                   </p:stCondLst>
@@ -9276,7 +9516,7 @@
                                         <p:strVal val="visible"/>
                                       </p:to>
                                     </p:set>
-                                    <p:animEffect transition="in" filter="wipe(left)">
+                                    <p:animEffect transition="in" filter="fade">
                                       <p:cBhvr>
                                         <p:cTn id="7" dur="500"/>
                                         <p:tgtEl>
@@ -9359,7 +9599,7 @@
                             </p:stCondLst>
                             <p:childTnLst>
                               <p:par>
-                                <p:cTn id="15" presetID="22" presetClass="entr" presetSubtype="8" fill="hold" grpId="0" nodeType="clickEffect">
+                                <p:cTn id="15" presetID="10" presetClass="entr" presetSubtype="0" fill="hold" grpId="0" nodeType="clickEffect">
                                   <p:stCondLst>
                                     <p:cond delay="0"/>
                                   </p:stCondLst>
@@ -9382,7 +9622,7 @@
                                         <p:strVal val="visible"/>
                                       </p:to>
                                     </p:set>
-                                    <p:animEffect transition="in" filter="wipe(left)">
+                                    <p:animEffect transition="in" filter="fade">
                                       <p:cBhvr>
                                         <p:cTn id="17" dur="500"/>
                                         <p:tgtEl>
@@ -9762,7 +10002,7 @@
                             </p:stCondLst>
                             <p:childTnLst>
                               <p:par>
-                                <p:cTn id="50" presetID="22" presetClass="entr" presetSubtype="8" fill="hold" grpId="0" nodeType="clickEffect">
+                                <p:cTn id="50" presetID="22" presetClass="entr" presetSubtype="8" fill="hold" nodeType="clickEffect">
                                   <p:stCondLst>
                                     <p:cond delay="0"/>
                                   </p:stCondLst>
@@ -9775,7 +10015,7 @@
                                           </p:stCondLst>
                                         </p:cTn>
                                         <p:tgtEl>
-                                          <p:spTgt spid="75807"/>
+                                          <p:spTgt spid="7"/>
                                         </p:tgtEl>
                                         <p:attrNameLst>
                                           <p:attrName>style.visibility</p:attrName>
@@ -9789,7 +10029,7 @@
                                       <p:cBhvr>
                                         <p:cTn id="52" dur="1000"/>
                                         <p:tgtEl>
-                                          <p:spTgt spid="75807"/>
+                                          <p:spTgt spid="7"/>
                                         </p:tgtEl>
                                       </p:cBhvr>
                                     </p:animEffect>
@@ -9868,7 +10108,7 @@
                             </p:stCondLst>
                             <p:childTnLst>
                               <p:par>
-                                <p:cTn id="60" presetID="1" presetClass="entr" presetSubtype="0" fill="hold" nodeType="clickEffect">
+                                <p:cTn id="60" presetID="22" presetClass="entr" presetSubtype="8" fill="hold" nodeType="clickEffect">
                                   <p:stCondLst>
                                     <p:cond delay="0"/>
                                   </p:stCondLst>
@@ -9891,54 +10131,9 @@
                                         <p:strVal val="visible"/>
                                       </p:to>
                                     </p:set>
-                                  </p:childTnLst>
-                                </p:cTn>
-                              </p:par>
-                            </p:childTnLst>
-                          </p:cTn>
-                        </p:par>
-                      </p:childTnLst>
-                    </p:cTn>
-                  </p:par>
-                  <p:par>
-                    <p:cTn id="62" fill="hold">
-                      <p:stCondLst>
-                        <p:cond delay="indefinite"/>
-                      </p:stCondLst>
-                      <p:childTnLst>
-                        <p:par>
-                          <p:cTn id="63" fill="hold">
-                            <p:stCondLst>
-                              <p:cond delay="0"/>
-                            </p:stCondLst>
-                            <p:childTnLst>
-                              <p:par>
-                                <p:cTn id="64" presetID="22" presetClass="entr" presetSubtype="8" fill="hold" nodeType="clickEffect">
-                                  <p:stCondLst>
-                                    <p:cond delay="0"/>
-                                  </p:stCondLst>
-                                  <p:childTnLst>
-                                    <p:set>
-                                      <p:cBhvr>
-                                        <p:cTn id="65" dur="1" fill="hold">
-                                          <p:stCondLst>
-                                            <p:cond delay="0"/>
-                                          </p:stCondLst>
-                                        </p:cTn>
-                                        <p:tgtEl>
-                                          <p:spTgt spid="49"/>
-                                        </p:tgtEl>
-                                        <p:attrNameLst>
-                                          <p:attrName>style.visibility</p:attrName>
-                                        </p:attrNameLst>
-                                      </p:cBhvr>
-                                      <p:to>
-                                        <p:strVal val="visible"/>
-                                      </p:to>
-                                    </p:set>
                                     <p:animEffect transition="in" filter="wipe(left)">
                                       <p:cBhvr>
-                                        <p:cTn id="66" dur="1000"/>
+                                        <p:cTn id="62" dur="1000"/>
                                         <p:tgtEl>
                                           <p:spTgt spid="49"/>
                                         </p:tgtEl>
@@ -9975,7 +10170,6 @@
       </p:par>
     </p:tnLst>
     <p:bldLst>
-      <p:bldP spid="75807" grpId="0"/>
       <p:bldP spid="16394" grpId="1" build="p"/>
       <p:bldP spid="54" grpId="0"/>
       <p:bldP spid="56" grpId="0"/>
@@ -14494,32 +14688,8 @@
                   </a:solidFill>
                   <a:latin typeface="+mj-lt"/>
                 </a:rPr>
-                <a:t>pick </a:t>
+                <a:t>pick 1|prize 1]</a:t>
               </a:r>
-              <a:r>
-                <a:rPr lang="en-US" sz="2800" dirty="0" smtClean="0">
-                  <a:solidFill>
-                    <a:srgbClr val="0000CC"/>
-                  </a:solidFill>
-                  <a:latin typeface="+mj-lt"/>
-                </a:rPr>
-                <a:t>1|prize </a:t>
-              </a:r>
-              <a:r>
-                <a:rPr lang="en-US" sz="2800" dirty="0" smtClean="0">
-                  <a:solidFill>
-                    <a:srgbClr val="0000CC"/>
-                  </a:solidFill>
-                  <a:latin typeface="+mj-lt"/>
-                </a:rPr>
-                <a:t>1]</a:t>
-              </a:r>
-              <a:endParaRPr lang="en-US" sz="2800" dirty="0" smtClean="0">
-                <a:solidFill>
-                  <a:srgbClr val="0000CC"/>
-                </a:solidFill>
-                <a:latin typeface="+mj-lt"/>
-              </a:endParaRPr>
             </a:p>
           </p:txBody>
         </p:sp>
@@ -14617,32 +14787,8 @@
                   </a:solidFill>
                   <a:latin typeface="+mj-lt"/>
                 </a:rPr>
-                <a:t>pick </a:t>
+                <a:t>pick 2|prize 3]</a:t>
               </a:r>
-              <a:r>
-                <a:rPr lang="en-US" sz="2800" dirty="0" smtClean="0">
-                  <a:solidFill>
-                    <a:srgbClr val="0000CC"/>
-                  </a:solidFill>
-                  <a:latin typeface="+mj-lt"/>
-                </a:rPr>
-                <a:t>2|prize </a:t>
-              </a:r>
-              <a:r>
-                <a:rPr lang="en-US" sz="2800" dirty="0" smtClean="0">
-                  <a:solidFill>
-                    <a:srgbClr val="0000CC"/>
-                  </a:solidFill>
-                  <a:latin typeface="+mj-lt"/>
-                </a:rPr>
-                <a:t>3]</a:t>
-              </a:r>
-              <a:endParaRPr lang="en-US" sz="2800" dirty="0" smtClean="0">
-                <a:solidFill>
-                  <a:srgbClr val="0000CC"/>
-                </a:solidFill>
-                <a:latin typeface="+mj-lt"/>
-              </a:endParaRPr>
             </a:p>
           </p:txBody>
         </p:sp>
@@ -14728,16 +14874,7 @@
                 </a:solidFill>
                 <a:latin typeface="+mj-lt"/>
               </a:rPr>
-              <a:t>open </a:t>
-            </a:r>
-            <a:r>
-              <a:rPr lang="en-US" sz="2800" dirty="0" smtClean="0">
-                <a:solidFill>
-                  <a:srgbClr val="0000CC"/>
-                </a:solidFill>
-                <a:latin typeface="+mj-lt"/>
-              </a:rPr>
-              <a:t>3|</a:t>
+              <a:t>open 3|</a:t>
             </a:r>
           </a:p>
           <a:p>
@@ -14758,7 +14895,7 @@
                 </a:solidFill>
                 <a:latin typeface="+mj-lt"/>
               </a:rPr>
-              <a:t>2]</a:t>
+              <a:t>1]</a:t>
             </a:r>
             <a:endParaRPr lang="en-US" sz="2800" dirty="0" smtClean="0">
               <a:solidFill>
@@ -14773,20 +14910,19 @@
         <p:nvCxnSpPr>
           <p:cNvPr id="27" name="Curved Connector 26"/>
           <p:cNvCxnSpPr>
-            <a:stCxn id="31841" idx="3"/>
+            <a:stCxn id="31836" idx="2"/>
             <a:endCxn id="139" idx="2"/>
           </p:cNvCxnSpPr>
           <p:nvPr/>
         </p:nvCxnSpPr>
         <p:spPr bwMode="auto">
-          <a:xfrm>
-            <a:off x="4737100" y="1677988"/>
-            <a:ext cx="2666075" cy="1565147"/>
-          </a:xfrm>
-          <a:prstGeom prst="curvedConnector4">
+          <a:xfrm rot="16200000" flipH="1">
+            <a:off x="5117702" y="957661"/>
+            <a:ext cx="1795335" cy="2775612"/>
+          </a:xfrm>
+          <a:prstGeom prst="curvedConnector3">
             <a:avLst>
-              <a:gd name="adj1" fmla="val 18867"/>
-              <a:gd name="adj2" fmla="val 114606"/>
+              <a:gd name="adj1" fmla="val 112733"/>
             </a:avLst>
           </a:prstGeom>
           <a:solidFill>
@@ -14944,7 +15080,7 @@
                             </p:stCondLst>
                             <p:childTnLst>
                               <p:par>
-                                <p:cTn id="15" presetID="9" presetClass="entr" presetSubtype="0" fill="hold" grpId="0" nodeType="clickEffect">
+                                <p:cTn id="15" presetID="10" presetClass="entr" presetSubtype="0" fill="hold" grpId="0" nodeType="clickEffect">
                                   <p:stCondLst>
                                     <p:cond delay="0"/>
                                   </p:stCondLst>
@@ -14967,7 +15103,7 @@
                                         <p:strVal val="visible"/>
                                       </p:to>
                                     </p:set>
-                                    <p:animEffect transition="in" filter="dissolve">
+                                    <p:animEffect transition="in" filter="fade">
                                       <p:cBhvr>
                                         <p:cTn id="17" dur="500"/>
                                         <p:tgtEl>
@@ -15757,25 +15893,25 @@
           <p:nvPr>
             <p:extLst>
               <p:ext uri="{D42A27DB-BD31-4B8C-83A1-F6EECF244321}">
-                <p14:modId xmlns:p14="http://schemas.microsoft.com/office/powerpoint/2010/main" val="1089715247"/>
+                <p14:modId xmlns:p14="http://schemas.microsoft.com/office/powerpoint/2010/main" val="2459628380"/>
               </p:ext>
             </p:extLst>
           </p:nvPr>
         </p:nvGraphicFramePr>
         <p:xfrm>
-          <a:off x="1216025" y="2108200"/>
-          <a:ext cx="6662738" cy="2806700"/>
+          <a:off x="2017713" y="1906016"/>
+          <a:ext cx="5057775" cy="1282700"/>
         </p:xfrm>
         <a:graphic>
           <a:graphicData uri="http://schemas.openxmlformats.org/presentationml/2006/ole">
             <mc:AlternateContent xmlns:mc="http://schemas.openxmlformats.org/markup-compatibility/2006">
               <mc:Choice xmlns:v="urn:schemas-microsoft-com:vml" Requires="v">
-                <p:oleObj spid="_x0000_s3142" name="Equation" r:id="rId4" imgW="1054100" imgH="444500" progId="Equation.DSMT4">
+                <p:oleObj spid="_x0000_s3149" name="Equation" r:id="rId4" imgW="800100" imgH="203200" progId="Equation.DSMT4">
                   <p:embed/>
                 </p:oleObj>
               </mc:Choice>
               <mc:Fallback>
-                <p:oleObj name="Equation" r:id="rId4" imgW="1054100" imgH="444500" progId="Equation.DSMT4">
+                <p:oleObj name="Equation" r:id="rId4" imgW="800100" imgH="203200" progId="Equation.DSMT4">
                   <p:embed/>
                   <p:pic>
                     <p:nvPicPr>
@@ -15794,14 +15930,71 @@
                     </p:blipFill>
                     <p:spPr bwMode="auto">
                       <a:xfrm>
-                        <a:off x="1216025" y="2108200"/>
-                        <a:ext cx="6662738" cy="2806700"/>
+                        <a:off x="2017713" y="1906016"/>
+                        <a:ext cx="5057775" cy="1282700"/>
                       </a:xfrm>
                       <a:prstGeom prst="rect">
                         <a:avLst/>
                       </a:prstGeom>
                       <a:noFill/>
                       <a:extLst/>
+                    </p:spPr>
+                  </p:pic>
+                </p:oleObj>
+              </mc:Fallback>
+            </mc:AlternateContent>
+          </a:graphicData>
+        </a:graphic>
+      </p:graphicFrame>
+      <p:graphicFrame>
+        <p:nvGraphicFramePr>
+          <p:cNvPr id="2" name="Object 1"/>
+          <p:cNvGraphicFramePr>
+            <a:graphicFrameLocks noChangeAspect="1"/>
+          </p:cNvGraphicFramePr>
+          <p:nvPr>
+            <p:extLst>
+              <p:ext uri="{D42A27DB-BD31-4B8C-83A1-F6EECF244321}">
+                <p14:modId xmlns:p14="http://schemas.microsoft.com/office/powerpoint/2010/main" val="3545881638"/>
+              </p:ext>
+            </p:extLst>
+          </p:nvPr>
+        </p:nvGraphicFramePr>
+        <p:xfrm>
+          <a:off x="1371047" y="3300370"/>
+          <a:ext cx="6398732" cy="1464770"/>
+        </p:xfrm>
+        <a:graphic>
+          <a:graphicData uri="http://schemas.openxmlformats.org/presentationml/2006/ole">
+            <mc:AlternateContent xmlns:mc="http://schemas.openxmlformats.org/markup-compatibility/2006">
+              <mc:Choice xmlns:v="urn:schemas-microsoft-com:vml" Requires="v">
+                <p:oleObj spid="_x0000_s3150" name="Equation" r:id="rId6" imgW="1054100" imgH="241300" progId="Equation.DSMT4">
+                  <p:embed/>
+                </p:oleObj>
+              </mc:Choice>
+              <mc:Fallback>
+                <p:oleObj name="Equation" r:id="rId6" imgW="1054100" imgH="241300" progId="Equation.DSMT4">
+                  <p:embed/>
+                  <p:pic>
+                    <p:nvPicPr>
+                      <p:cNvPr id="0" name=""/>
+                      <p:cNvPicPr/>
+                      <p:nvPr/>
+                    </p:nvPicPr>
+                    <p:blipFill>
+                      <a:blip r:embed="rId7"/>
+                      <a:stretch>
+                        <a:fillRect/>
+                      </a:stretch>
+                    </p:blipFill>
+                    <p:spPr>
+                      <a:xfrm>
+                        <a:off x="1371047" y="3300370"/>
+                        <a:ext cx="6398732" cy="1464770"/>
+                      </a:xfrm>
+                      <a:prstGeom prst="rect">
+                        <a:avLst/>
+                      </a:prstGeom>
                     </p:spPr>
                   </p:pic>
                 </p:oleObj>
@@ -15839,7 +16032,7 @@
                             </p:stCondLst>
                             <p:childTnLst>
                               <p:par>
-                                <p:cTn id="5" presetID="22" presetClass="entr" presetSubtype="1" fill="hold" nodeType="clickEffect">
+                                <p:cTn id="5" presetID="22" presetClass="entr" presetSubtype="8" fill="hold" nodeType="clickEffect">
                                   <p:stCondLst>
                                     <p:cond delay="0"/>
                                   </p:stCondLst>
@@ -15862,9 +16055,9 @@
                                         <p:strVal val="visible"/>
                                       </p:to>
                                     </p:set>
-                                    <p:animEffect transition="in" filter="wipe(up)">
+                                    <p:animEffect transition="in" filter="wipe(left)">
                                       <p:cBhvr>
-                                        <p:cTn id="7" dur="1000"/>
+                                        <p:cTn id="7" dur="500"/>
                                         <p:tgtEl>
                                           <p:spTgt spid="3074"/>
                                         </p:tgtEl>
@@ -15892,7 +16085,7 @@
                             </p:stCondLst>
                             <p:childTnLst>
                               <p:par>
-                                <p:cTn id="10" presetID="9" presetClass="entr" presetSubtype="0" fill="hold" grpId="0" nodeType="clickEffect">
+                                <p:cTn id="10" presetID="22" presetClass="entr" presetSubtype="8" fill="hold" nodeType="clickEffect">
                                   <p:stCondLst>
                                     <p:cond delay="0"/>
                                   </p:stCondLst>
@@ -15900,6 +16093,59 @@
                                     <p:set>
                                       <p:cBhvr>
                                         <p:cTn id="11" dur="1" fill="hold">
+                                          <p:stCondLst>
+                                            <p:cond delay="0"/>
+                                          </p:stCondLst>
+                                        </p:cTn>
+                                        <p:tgtEl>
+                                          <p:spTgt spid="2"/>
+                                        </p:tgtEl>
+                                        <p:attrNameLst>
+                                          <p:attrName>style.visibility</p:attrName>
+                                        </p:attrNameLst>
+                                      </p:cBhvr>
+                                      <p:to>
+                                        <p:strVal val="visible"/>
+                                      </p:to>
+                                    </p:set>
+                                    <p:animEffect transition="in" filter="wipe(left)">
+                                      <p:cBhvr>
+                                        <p:cTn id="12" dur="1000"/>
+                                        <p:tgtEl>
+                                          <p:spTgt spid="2"/>
+                                        </p:tgtEl>
+                                      </p:cBhvr>
+                                    </p:animEffect>
+                                  </p:childTnLst>
+                                </p:cTn>
+                              </p:par>
+                            </p:childTnLst>
+                          </p:cTn>
+                        </p:par>
+                      </p:childTnLst>
+                    </p:cTn>
+                  </p:par>
+                  <p:par>
+                    <p:cTn id="13" fill="hold">
+                      <p:stCondLst>
+                        <p:cond delay="indefinite"/>
+                      </p:stCondLst>
+                      <p:childTnLst>
+                        <p:par>
+                          <p:cTn id="14" fill="hold">
+                            <p:stCondLst>
+                              <p:cond delay="0"/>
+                            </p:stCondLst>
+                            <p:childTnLst>
+                              <p:par>
+                                <p:cTn id="15" presetID="9" presetClass="entr" presetSubtype="0" fill="hold" grpId="0" nodeType="clickEffect">
+                                  <p:stCondLst>
+                                    <p:cond delay="0"/>
+                                  </p:stCondLst>
+                                  <p:childTnLst>
+                                    <p:set>
+                                      <p:cBhvr>
+                                        <p:cTn id="16" dur="1" fill="hold">
                                           <p:stCondLst>
                                             <p:cond delay="0"/>
                                           </p:stCondLst>
@@ -15917,7 +16163,7 @@
                                     </p:set>
                                     <p:animEffect transition="in" filter="dissolve">
                                       <p:cBhvr>
-                                        <p:cTn id="12" dur="500"/>
+                                        <p:cTn id="17" dur="500"/>
                                         <p:tgtEl>
                                           <p:spTgt spid="3077"/>
                                         </p:tgtEl>

</xml_diff>